<commit_message>
completed new server configuration and workflow diagram
</commit_message>
<xml_diff>
--- a/Slack UI Screenshot App.pptx
+++ b/Slack UI Screenshot App.pptx
@@ -9,7 +9,7 @@
   </p:notesMasterIdLst>
   <p:sldIdLst>
     <p:sldId id="256" r:id="rId2"/>
-    <p:sldId id="258" r:id="rId3"/>
+    <p:sldId id="260" r:id="rId3"/>
     <p:sldId id="259" r:id="rId4"/>
   </p:sldIdLst>
   <p:sldSz cx="9144000" cy="6858000" type="screen4x3"/>
@@ -194,7 +194,7 @@
           <a:p>
             <a:fld id="{F355558A-C583-433E-8C58-C401C6E4FD44}" type="datetimeFigureOut">
               <a:rPr lang="en-US" smtClean="0"/>
-              <a:t>4/27/2017</a:t>
+              <a:t>6/7/2017</a:t>
             </a:fld>
             <a:endParaRPr lang="en-US"/>
           </a:p>
@@ -460,90 +460,6 @@
     </a:lvl9pPr>
   </p:notesStyle>
 </p:notesMaster>
-</file>
-
-<file path=ppt/notesSlides/notesSlide1.xml><?xml version="1.0" encoding="utf-8"?>
-<p:notes xmlns:a="http://schemas.openxmlformats.org/drawingml/2006/main" xmlns:r="http://schemas.openxmlformats.org/officeDocument/2006/relationships" xmlns:p="http://schemas.openxmlformats.org/presentationml/2006/main">
-  <p:cSld>
-    <p:spTree>
-      <p:nvGrpSpPr>
-        <p:cNvPr id="1" name=""/>
-        <p:cNvGrpSpPr/>
-        <p:nvPr/>
-      </p:nvGrpSpPr>
-      <p:grpSpPr>
-        <a:xfrm>
-          <a:off x="0" y="0"/>
-          <a:ext cx="0" cy="0"/>
-          <a:chOff x="0" y="0"/>
-          <a:chExt cx="0" cy="0"/>
-        </a:xfrm>
-      </p:grpSpPr>
-      <p:sp>
-        <p:nvSpPr>
-          <p:cNvPr id="2" name="Slide Image Placeholder 1"/>
-          <p:cNvSpPr>
-            <a:spLocks noGrp="1" noRot="1" noChangeAspect="1"/>
-          </p:cNvSpPr>
-          <p:nvPr>
-            <p:ph type="sldImg"/>
-          </p:nvPr>
-        </p:nvSpPr>
-        <p:spPr/>
-      </p:sp>
-      <p:sp>
-        <p:nvSpPr>
-          <p:cNvPr id="3" name="Notes Placeholder 2"/>
-          <p:cNvSpPr>
-            <a:spLocks noGrp="1"/>
-          </p:cNvSpPr>
-          <p:nvPr>
-            <p:ph type="body" idx="1"/>
-          </p:nvPr>
-        </p:nvSpPr>
-        <p:spPr/>
-        <p:txBody>
-          <a:bodyPr/>
-          <a:lstStyle/>
-          <a:p>
-            <a:endParaRPr lang="en-US" dirty="0"/>
-          </a:p>
-        </p:txBody>
-      </p:sp>
-      <p:sp>
-        <p:nvSpPr>
-          <p:cNvPr id="4" name="Slide Number Placeholder 3"/>
-          <p:cNvSpPr>
-            <a:spLocks noGrp="1"/>
-          </p:cNvSpPr>
-          <p:nvPr>
-            <p:ph type="sldNum" sz="quarter" idx="10"/>
-          </p:nvPr>
-        </p:nvSpPr>
-        <p:spPr/>
-        <p:txBody>
-          <a:bodyPr/>
-          <a:lstStyle/>
-          <a:p>
-            <a:fld id="{7A7DE8C9-8C03-4509-B572-245EAFEE7719}" type="slidenum">
-              <a:rPr lang="en-US" smtClean="0"/>
-              <a:t>2</a:t>
-            </a:fld>
-            <a:endParaRPr lang="en-US"/>
-          </a:p>
-        </p:txBody>
-      </p:sp>
-    </p:spTree>
-    <p:extLst>
-      <p:ext uri="{BB962C8B-B14F-4D97-AF65-F5344CB8AC3E}">
-        <p14:creationId xmlns:p14="http://schemas.microsoft.com/office/powerpoint/2010/main" val="2351363554"/>
-      </p:ext>
-    </p:extLst>
-  </p:cSld>
-  <p:clrMapOvr>
-    <a:masterClrMapping/>
-  </p:clrMapOvr>
-</p:notes>
 </file>
 
 <file path=ppt/slideLayouts/slideLayout1.xml><?xml version="1.0" encoding="utf-8"?>
@@ -1171,7 +1087,7 @@
           <a:p>
             <a:fld id="{B94EC5BE-1084-4C3B-ABA7-5D08BFDB57DD}" type="datetimeFigureOut">
               <a:rPr lang="en-US" smtClean="0"/>
-              <a:t>4/27/2017</a:t>
+              <a:t>6/7/2017</a:t>
             </a:fld>
             <a:endParaRPr lang="en-US"/>
           </a:p>
@@ -1367,7 +1283,7 @@
           <a:p>
             <a:fld id="{B94EC5BE-1084-4C3B-ABA7-5D08BFDB57DD}" type="datetimeFigureOut">
               <a:rPr lang="en-US" smtClean="0"/>
-              <a:t>4/27/2017</a:t>
+              <a:t>6/7/2017</a:t>
             </a:fld>
             <a:endParaRPr lang="en-US"/>
           </a:p>
@@ -1552,7 +1468,7 @@
           <a:p>
             <a:fld id="{B94EC5BE-1084-4C3B-ABA7-5D08BFDB57DD}" type="datetimeFigureOut">
               <a:rPr lang="en-US" smtClean="0"/>
-              <a:t>4/27/2017</a:t>
+              <a:t>6/7/2017</a:t>
             </a:fld>
             <a:endParaRPr lang="en-US"/>
           </a:p>
@@ -1702,7 +1618,7 @@
           <a:p>
             <a:fld id="{B94EC5BE-1084-4C3B-ABA7-5D08BFDB57DD}" type="datetimeFigureOut">
               <a:rPr lang="en-US" smtClean="0"/>
-              <a:t>4/27/2017</a:t>
+              <a:t>6/7/2017</a:t>
             </a:fld>
             <a:endParaRPr lang="en-US"/>
           </a:p>
@@ -1957,7 +1873,7 @@
           <a:p>
             <a:fld id="{B94EC5BE-1084-4C3B-ABA7-5D08BFDB57DD}" type="datetimeFigureOut">
               <a:rPr lang="en-US" smtClean="0"/>
-              <a:t>4/27/2017</a:t>
+              <a:t>6/7/2017</a:t>
             </a:fld>
             <a:endParaRPr lang="en-US"/>
           </a:p>
@@ -2366,7 +2282,7 @@
           <a:p>
             <a:fld id="{B94EC5BE-1084-4C3B-ABA7-5D08BFDB57DD}" type="datetimeFigureOut">
               <a:rPr lang="en-US" smtClean="0"/>
-              <a:t>4/27/2017</a:t>
+              <a:t>6/7/2017</a:t>
             </a:fld>
             <a:endParaRPr lang="en-US"/>
           </a:p>
@@ -2812,7 +2728,7 @@
           <a:p>
             <a:fld id="{B94EC5BE-1084-4C3B-ABA7-5D08BFDB57DD}" type="datetimeFigureOut">
               <a:rPr lang="en-US" smtClean="0"/>
-              <a:t>4/27/2017</a:t>
+              <a:t>6/7/2017</a:t>
             </a:fld>
             <a:endParaRPr lang="en-US"/>
           </a:p>
@@ -2913,7 +2829,7 @@
           <a:p>
             <a:fld id="{B94EC5BE-1084-4C3B-ABA7-5D08BFDB57DD}" type="datetimeFigureOut">
               <a:rPr lang="en-US" smtClean="0"/>
-              <a:t>4/27/2017</a:t>
+              <a:t>6/7/2017</a:t>
             </a:fld>
             <a:endParaRPr lang="en-US"/>
           </a:p>
@@ -3034,7 +2950,7 @@
           <a:p>
             <a:fld id="{B94EC5BE-1084-4C3B-ABA7-5D08BFDB57DD}" type="datetimeFigureOut">
               <a:rPr lang="en-US" smtClean="0"/>
-              <a:t>4/27/2017</a:t>
+              <a:t>6/7/2017</a:t>
             </a:fld>
             <a:endParaRPr lang="en-US"/>
           </a:p>
@@ -3308,7 +3224,7 @@
           <a:p>
             <a:fld id="{B94EC5BE-1084-4C3B-ABA7-5D08BFDB57DD}" type="datetimeFigureOut">
               <a:rPr lang="en-US" smtClean="0"/>
-              <a:t>4/27/2017</a:t>
+              <a:t>6/7/2017</a:t>
             </a:fld>
             <a:endParaRPr lang="en-US"/>
           </a:p>
@@ -3513,7 +3429,7 @@
           <a:p>
             <a:fld id="{B94EC5BE-1084-4C3B-ABA7-5D08BFDB57DD}" type="datetimeFigureOut">
               <a:rPr lang="en-US" smtClean="0"/>
-              <a:t>4/27/2017</a:t>
+              <a:t>6/7/2017</a:t>
             </a:fld>
             <a:endParaRPr lang="en-US"/>
           </a:p>
@@ -4622,7 +4538,7 @@
           <a:p>
             <a:fld id="{B94EC5BE-1084-4C3B-ABA7-5D08BFDB57DD}" type="datetimeFigureOut">
               <a:rPr lang="en-US" smtClean="0"/>
-              <a:t>4/27/2017</a:t>
+              <a:t>6/7/2017</a:t>
             </a:fld>
             <a:endParaRPr lang="en-US"/>
           </a:p>
@@ -5110,18 +5026,53 @@
       </p:grpSpPr>
       <p:sp>
         <p:nvSpPr>
-          <p:cNvPr id="17" name="Rounded Rectangle 16"/>
+          <p:cNvPr id="3" name="Title 2"/>
+          <p:cNvSpPr>
+            <a:spLocks noGrp="1"/>
+          </p:cNvSpPr>
+          <p:nvPr>
+            <p:ph type="title"/>
+          </p:nvPr>
+        </p:nvSpPr>
+        <p:spPr/>
+        <p:txBody>
+          <a:bodyPr>
+            <a:normAutofit/>
+          </a:bodyPr>
+          <a:lstStyle/>
+          <a:p>
+            <a:r>
+              <a:rPr lang="en-US" sz="2800" dirty="0" smtClean="0"/>
+              <a:t>Server Configuration and Process Flow</a:t>
+            </a:r>
+            <a:endParaRPr lang="en-US" sz="2800" dirty="0"/>
+          </a:p>
+        </p:txBody>
+      </p:sp>
+      <p:sp>
+        <p:nvSpPr>
+          <p:cNvPr id="10" name="Rounded Rectangle 9"/>
           <p:cNvSpPr/>
           <p:nvPr/>
         </p:nvSpPr>
         <p:spPr>
           <a:xfrm>
-            <a:off x="228600" y="152400"/>
-            <a:ext cx="685800" cy="457200"/>
+            <a:off x="685799" y="1219200"/>
+            <a:ext cx="1524000" cy="685800"/>
           </a:xfrm>
           <a:prstGeom prst="roundRect">
             <a:avLst/>
           </a:prstGeom>
+          <a:solidFill>
+            <a:schemeClr val="accent6"/>
+          </a:solidFill>
+          <a:ln w="38100" cmpd="sng">
+            <a:solidFill>
+              <a:schemeClr val="accent6">
+                <a:lumMod val="50000"/>
+              </a:schemeClr>
+            </a:solidFill>
+          </a:ln>
         </p:spPr>
         <p:style>
           <a:lnRef idx="2">
@@ -5145,26 +5096,37 @@
           <a:p>
             <a:pPr algn="ctr"/>
             <a:r>
-              <a:rPr lang="en-US" sz="1200" dirty="0" smtClean="0"/>
-              <a:t>Slack</a:t>
-            </a:r>
-          </a:p>
-        </p:txBody>
-      </p:sp>
-      <p:sp>
-        <p:nvSpPr>
-          <p:cNvPr id="18" name="Rounded Rectangle 17"/>
+              <a:rPr lang="en-US" sz="1000" dirty="0" smtClean="0"/>
+              <a:t>Slack.com</a:t>
+            </a:r>
+            <a:endParaRPr lang="en-US" sz="1000" dirty="0"/>
+          </a:p>
+        </p:txBody>
+      </p:sp>
+      <p:sp>
+        <p:nvSpPr>
+          <p:cNvPr id="12" name="Rounded Rectangle 11"/>
           <p:cNvSpPr/>
           <p:nvPr/>
         </p:nvSpPr>
         <p:spPr>
           <a:xfrm>
-            <a:off x="2209800" y="152400"/>
-            <a:ext cx="990600" cy="457200"/>
+            <a:off x="6529270" y="1219200"/>
+            <a:ext cx="1524000" cy="685800"/>
           </a:xfrm>
           <a:prstGeom prst="roundRect">
             <a:avLst/>
           </a:prstGeom>
+          <a:solidFill>
+            <a:schemeClr val="accent6"/>
+          </a:solidFill>
+          <a:ln w="38100" cmpd="sng">
+            <a:solidFill>
+              <a:schemeClr val="accent6">
+                <a:lumMod val="50000"/>
+              </a:schemeClr>
+            </a:solidFill>
+          </a:ln>
         </p:spPr>
         <p:style>
           <a:lnRef idx="2">
@@ -5188,26 +5150,28 @@
           <a:p>
             <a:pPr algn="ctr"/>
             <a:r>
-              <a:rPr lang="en-US" sz="1200" dirty="0" smtClean="0"/>
-              <a:t>Slack App</a:t>
-            </a:r>
-          </a:p>
-        </p:txBody>
-      </p:sp>
-      <p:sp>
-        <p:nvSpPr>
-          <p:cNvPr id="19" name="Rounded Rectangle 18"/>
+              <a:rPr lang="en-US" sz="1000" dirty="0" smtClean="0"/>
+              <a:t>Browserstack.com</a:t>
+            </a:r>
+            <a:endParaRPr lang="en-US" sz="1000" dirty="0"/>
+          </a:p>
+        </p:txBody>
+      </p:sp>
+      <p:sp>
+        <p:nvSpPr>
+          <p:cNvPr id="13" name="Rounded Rectangle 12"/>
           <p:cNvSpPr/>
           <p:nvPr/>
         </p:nvSpPr>
         <p:spPr>
           <a:xfrm>
-            <a:off x="4495800" y="152400"/>
-            <a:ext cx="1219200" cy="457200"/>
+            <a:off x="7391400" y="6208096"/>
+            <a:ext cx="1524000" cy="421304"/>
           </a:xfrm>
           <a:prstGeom prst="roundRect">
             <a:avLst/>
           </a:prstGeom>
+          <a:ln w="38100" cmpd="sng"/>
         </p:spPr>
         <p:style>
           <a:lnRef idx="2">
@@ -5231,34 +5195,37 @@
           <a:p>
             <a:pPr algn="ctr"/>
             <a:r>
-              <a:rPr lang="en-US" sz="1200" dirty="0" err="1" smtClean="0"/>
-              <a:t>Browserstack</a:t>
-            </a:r>
-            <a:r>
-              <a:rPr lang="en-US" sz="1200" dirty="0"/>
-              <a:t> </a:t>
-            </a:r>
-            <a:r>
-              <a:rPr lang="en-US" sz="1200" dirty="0" smtClean="0"/>
-              <a:t>App</a:t>
-            </a:r>
-          </a:p>
-        </p:txBody>
-      </p:sp>
-      <p:sp>
-        <p:nvSpPr>
-          <p:cNvPr id="20" name="Rounded Rectangle 19"/>
+              <a:rPr lang="en-US" sz="1000" dirty="0" smtClean="0"/>
+              <a:t>Node Services</a:t>
+            </a:r>
+            <a:endParaRPr lang="en-US" sz="1000" dirty="0"/>
+          </a:p>
+        </p:txBody>
+      </p:sp>
+      <p:sp>
+        <p:nvSpPr>
+          <p:cNvPr id="14" name="Rounded Rectangle 13"/>
           <p:cNvSpPr/>
           <p:nvPr/>
         </p:nvSpPr>
         <p:spPr>
           <a:xfrm>
-            <a:off x="6553200" y="152400"/>
-            <a:ext cx="1219200" cy="457200"/>
+            <a:off x="7391400" y="5715000"/>
+            <a:ext cx="1524000" cy="421304"/>
           </a:xfrm>
           <a:prstGeom prst="roundRect">
             <a:avLst/>
           </a:prstGeom>
+          <a:solidFill>
+            <a:schemeClr val="accent6"/>
+          </a:solidFill>
+          <a:ln w="38100" cmpd="sng">
+            <a:solidFill>
+              <a:schemeClr val="accent6">
+                <a:lumMod val="50000"/>
+              </a:schemeClr>
+            </a:solidFill>
+          </a:ln>
         </p:spPr>
         <p:style>
           <a:lnRef idx="2">
@@ -5282,28 +5249,545 @@
           <a:p>
             <a:pPr algn="ctr"/>
             <a:r>
-              <a:rPr lang="en-US" sz="1200" dirty="0" err="1" smtClean="0"/>
-              <a:t>Browserstack</a:t>
-            </a:r>
-            <a:endParaRPr lang="en-US" sz="1200" dirty="0" smtClean="0"/>
+              <a:rPr lang="en-US" sz="1000" dirty="0" smtClean="0"/>
+              <a:t>3</a:t>
+            </a:r>
+            <a:r>
+              <a:rPr lang="en-US" sz="1000" baseline="30000" dirty="0" smtClean="0"/>
+              <a:t>rd</a:t>
+            </a:r>
+            <a:r>
+              <a:rPr lang="en-US" sz="1000" dirty="0" smtClean="0"/>
+              <a:t> Party Services</a:t>
+            </a:r>
+            <a:endParaRPr lang="en-US" sz="1000" dirty="0"/>
+          </a:p>
+        </p:txBody>
+      </p:sp>
+      <p:sp>
+        <p:nvSpPr>
+          <p:cNvPr id="18" name="Rounded Rectangle 17"/>
+          <p:cNvSpPr/>
+          <p:nvPr/>
+        </p:nvSpPr>
+        <p:spPr>
+          <a:xfrm>
+            <a:off x="7391400" y="5217496"/>
+            <a:ext cx="1524000" cy="421304"/>
+          </a:xfrm>
+          <a:prstGeom prst="roundRect">
+            <a:avLst/>
+          </a:prstGeom>
+          <a:solidFill>
+            <a:schemeClr val="tx1">
+              <a:lumMod val="50000"/>
+              <a:lumOff val="50000"/>
+            </a:schemeClr>
+          </a:solidFill>
+          <a:ln w="38100" cmpd="sng">
+            <a:solidFill>
+              <a:schemeClr val="accent6">
+                <a:lumMod val="50000"/>
+              </a:schemeClr>
+            </a:solidFill>
+          </a:ln>
+        </p:spPr>
+        <p:style>
+          <a:lnRef idx="2">
+            <a:schemeClr val="accent1">
+              <a:shade val="50000"/>
+            </a:schemeClr>
+          </a:lnRef>
+          <a:fillRef idx="1">
+            <a:schemeClr val="accent1"/>
+          </a:fillRef>
+          <a:effectRef idx="0">
+            <a:schemeClr val="accent1"/>
+          </a:effectRef>
+          <a:fontRef idx="minor">
+            <a:schemeClr val="lt1"/>
+          </a:fontRef>
+        </p:style>
+        <p:txBody>
+          <a:bodyPr rtlCol="0" anchor="ctr"/>
+          <a:lstStyle/>
+          <a:p>
+            <a:pPr algn="ctr"/>
+            <a:r>
+              <a:rPr lang="en-US" sz="1000" dirty="0" err="1" smtClean="0"/>
+              <a:t>MooMoo</a:t>
+            </a:r>
+            <a:r>
+              <a:rPr lang="en-US" sz="1000" dirty="0" smtClean="0"/>
+              <a:t> (Slack App)</a:t>
+            </a:r>
+            <a:endParaRPr lang="en-US" sz="1000" dirty="0"/>
+          </a:p>
+        </p:txBody>
+      </p:sp>
+      <p:sp>
+        <p:nvSpPr>
+          <p:cNvPr id="19" name="Rounded Rectangle 18"/>
+          <p:cNvSpPr/>
+          <p:nvPr/>
+        </p:nvSpPr>
+        <p:spPr>
+          <a:xfrm>
+            <a:off x="685800" y="3110030"/>
+            <a:ext cx="1524000" cy="699970"/>
+          </a:xfrm>
+          <a:prstGeom prst="roundRect">
+            <a:avLst/>
+          </a:prstGeom>
+          <a:solidFill>
+            <a:schemeClr val="tx1">
+              <a:lumMod val="50000"/>
+              <a:lumOff val="50000"/>
+            </a:schemeClr>
+          </a:solidFill>
+          <a:ln w="38100" cmpd="sng">
+            <a:solidFill>
+              <a:schemeClr val="accent6">
+                <a:lumMod val="50000"/>
+              </a:schemeClr>
+            </a:solidFill>
+          </a:ln>
+        </p:spPr>
+        <p:style>
+          <a:lnRef idx="2">
+            <a:schemeClr val="accent1">
+              <a:shade val="50000"/>
+            </a:schemeClr>
+          </a:lnRef>
+          <a:fillRef idx="1">
+            <a:schemeClr val="accent1"/>
+          </a:fillRef>
+          <a:effectRef idx="0">
+            <a:schemeClr val="accent1"/>
+          </a:effectRef>
+          <a:fontRef idx="minor">
+            <a:schemeClr val="lt1"/>
+          </a:fontRef>
+        </p:style>
+        <p:txBody>
+          <a:bodyPr rtlCol="0" anchor="ctr"/>
+          <a:lstStyle/>
+          <a:p>
+            <a:pPr algn="ctr"/>
+            <a:r>
+              <a:rPr lang="en-US" sz="1000" dirty="0" err="1" smtClean="0"/>
+              <a:t>MooMoo</a:t>
+            </a:r>
+            <a:r>
+              <a:rPr lang="en-US" sz="1000" dirty="0" smtClean="0"/>
+              <a:t> (Slack App)</a:t>
+            </a:r>
+            <a:endParaRPr lang="en-US" sz="1000" dirty="0"/>
           </a:p>
         </p:txBody>
       </p:sp>
       <p:cxnSp>
         <p:nvCxnSpPr>
-          <p:cNvPr id="22" name="Straight Arrow Connector 21"/>
-          <p:cNvCxnSpPr/>
+          <p:cNvPr id="23" name="Straight Arrow Connector 22"/>
+          <p:cNvCxnSpPr>
+            <a:stCxn id="10" idx="2"/>
+            <a:endCxn id="19" idx="0"/>
+          </p:cNvCxnSpPr>
           <p:nvPr/>
         </p:nvCxnSpPr>
         <p:spPr>
           <a:xfrm>
-            <a:off x="568666" y="638973"/>
-            <a:ext cx="0" cy="5229220"/>
+            <a:off x="1447799" y="1905000"/>
+            <a:ext cx="1" cy="1205030"/>
           </a:xfrm>
           <a:prstGeom prst="straightConnector1">
             <a:avLst/>
           </a:prstGeom>
-          <a:ln w="57150">
+          <a:ln w="12700">
+            <a:solidFill>
+              <a:schemeClr val="tx1"/>
+            </a:solidFill>
+            <a:tailEnd type="arrow"/>
+          </a:ln>
+        </p:spPr>
+        <p:style>
+          <a:lnRef idx="1">
+            <a:schemeClr val="dk1"/>
+          </a:lnRef>
+          <a:fillRef idx="0">
+            <a:schemeClr val="dk1"/>
+          </a:fillRef>
+          <a:effectRef idx="0">
+            <a:schemeClr val="dk1"/>
+          </a:effectRef>
+          <a:fontRef idx="minor">
+            <a:schemeClr val="tx1"/>
+          </a:fontRef>
+        </p:style>
+      </p:cxnSp>
+      <p:sp>
+        <p:nvSpPr>
+          <p:cNvPr id="17" name="Rectangle 16"/>
+          <p:cNvSpPr/>
+          <p:nvPr/>
+        </p:nvSpPr>
+        <p:spPr>
+          <a:xfrm>
+            <a:off x="2895600" y="2362200"/>
+            <a:ext cx="2921910" cy="3048000"/>
+          </a:xfrm>
+          <a:prstGeom prst="rect">
+            <a:avLst/>
+          </a:prstGeom>
+          <a:solidFill>
+            <a:schemeClr val="bg2"/>
+          </a:solidFill>
+          <a:ln w="12700" cmpd="sng">
+            <a:solidFill>
+              <a:schemeClr val="bg2">
+                <a:lumMod val="25000"/>
+              </a:schemeClr>
+            </a:solidFill>
+          </a:ln>
+        </p:spPr>
+        <p:style>
+          <a:lnRef idx="2">
+            <a:schemeClr val="accent1">
+              <a:shade val="50000"/>
+            </a:schemeClr>
+          </a:lnRef>
+          <a:fillRef idx="1">
+            <a:schemeClr val="accent1"/>
+          </a:fillRef>
+          <a:effectRef idx="0">
+            <a:schemeClr val="accent1"/>
+          </a:effectRef>
+          <a:fontRef idx="minor">
+            <a:schemeClr val="lt1"/>
+          </a:fontRef>
+        </p:style>
+        <p:txBody>
+          <a:bodyPr rtlCol="0" anchor="t"/>
+          <a:lstStyle/>
+          <a:p>
+            <a:r>
+              <a:rPr lang="en-US" sz="1100" dirty="0" smtClean="0">
+                <a:solidFill>
+                  <a:schemeClr val="tx1"/>
+                </a:solidFill>
+              </a:rPr>
+              <a:t>KBB Server with access to internal sites</a:t>
+            </a:r>
+            <a:endParaRPr lang="en-US" sz="1100" dirty="0">
+              <a:solidFill>
+                <a:schemeClr val="tx1"/>
+              </a:solidFill>
+            </a:endParaRPr>
+          </a:p>
+        </p:txBody>
+      </p:sp>
+      <p:sp>
+        <p:nvSpPr>
+          <p:cNvPr id="7" name="Rounded Rectangle 6"/>
+          <p:cNvSpPr/>
+          <p:nvPr/>
+        </p:nvSpPr>
+        <p:spPr>
+          <a:xfrm>
+            <a:off x="3581400" y="2825697"/>
+            <a:ext cx="1524000" cy="762000"/>
+          </a:xfrm>
+          <a:prstGeom prst="roundRect">
+            <a:avLst/>
+          </a:prstGeom>
+          <a:ln w="38100" cmpd="sng"/>
+        </p:spPr>
+        <p:style>
+          <a:lnRef idx="2">
+            <a:schemeClr val="accent1">
+              <a:shade val="50000"/>
+            </a:schemeClr>
+          </a:lnRef>
+          <a:fillRef idx="1">
+            <a:schemeClr val="accent1"/>
+          </a:fillRef>
+          <a:effectRef idx="0">
+            <a:schemeClr val="accent1"/>
+          </a:effectRef>
+          <a:fontRef idx="minor">
+            <a:schemeClr val="lt1"/>
+          </a:fontRef>
+        </p:style>
+        <p:txBody>
+          <a:bodyPr rtlCol="0" anchor="ctr"/>
+          <a:lstStyle/>
+          <a:p>
+            <a:pPr algn="ctr"/>
+            <a:r>
+              <a:rPr lang="en-US" sz="1000" dirty="0" smtClean="0"/>
+              <a:t>Slack </a:t>
+            </a:r>
+          </a:p>
+          <a:p>
+            <a:pPr algn="ctr"/>
+            <a:r>
+              <a:rPr lang="en-US" sz="1000" dirty="0" smtClean="0"/>
+              <a:t>Service</a:t>
+            </a:r>
+            <a:endParaRPr lang="en-US" sz="1000" dirty="0"/>
+          </a:p>
+        </p:txBody>
+      </p:sp>
+      <p:sp>
+        <p:nvSpPr>
+          <p:cNvPr id="8" name="Rounded Rectangle 7"/>
+          <p:cNvSpPr/>
+          <p:nvPr/>
+        </p:nvSpPr>
+        <p:spPr>
+          <a:xfrm>
+            <a:off x="3578881" y="4197926"/>
+            <a:ext cx="1524000" cy="762000"/>
+          </a:xfrm>
+          <a:prstGeom prst="roundRect">
+            <a:avLst/>
+          </a:prstGeom>
+          <a:ln w="38100" cmpd="sng"/>
+        </p:spPr>
+        <p:style>
+          <a:lnRef idx="2">
+            <a:schemeClr val="accent1">
+              <a:shade val="50000"/>
+            </a:schemeClr>
+          </a:lnRef>
+          <a:fillRef idx="1">
+            <a:schemeClr val="accent1"/>
+          </a:fillRef>
+          <a:effectRef idx="0">
+            <a:schemeClr val="accent1"/>
+          </a:effectRef>
+          <a:fontRef idx="minor">
+            <a:schemeClr val="lt1"/>
+          </a:fontRef>
+        </p:style>
+        <p:txBody>
+          <a:bodyPr rtlCol="0" anchor="ctr"/>
+          <a:lstStyle/>
+          <a:p>
+            <a:pPr algn="ctr"/>
+            <a:r>
+              <a:rPr lang="en-US" sz="1000" dirty="0" err="1" smtClean="0"/>
+              <a:t>Browserstack</a:t>
+            </a:r>
+            <a:endParaRPr lang="en-US" sz="1000" dirty="0"/>
+          </a:p>
+          <a:p>
+            <a:pPr algn="ctr"/>
+            <a:r>
+              <a:rPr lang="en-US" sz="1000" dirty="0" smtClean="0"/>
+              <a:t>Service</a:t>
+            </a:r>
+            <a:endParaRPr lang="en-US" sz="1000" dirty="0"/>
+          </a:p>
+        </p:txBody>
+      </p:sp>
+      <p:sp>
+        <p:nvSpPr>
+          <p:cNvPr id="9" name="Rectangle 8"/>
+          <p:cNvSpPr/>
+          <p:nvPr/>
+        </p:nvSpPr>
+        <p:spPr>
+          <a:xfrm>
+            <a:off x="3695700" y="5124607"/>
+            <a:ext cx="1295400" cy="152400"/>
+          </a:xfrm>
+          <a:prstGeom prst="rect">
+            <a:avLst/>
+          </a:prstGeom>
+          <a:solidFill>
+            <a:schemeClr val="tx2">
+              <a:lumMod val="20000"/>
+              <a:lumOff val="80000"/>
+            </a:schemeClr>
+          </a:solidFill>
+          <a:ln w="34925">
+            <a:noFill/>
+          </a:ln>
+        </p:spPr>
+        <p:style>
+          <a:lnRef idx="2">
+            <a:schemeClr val="accent1">
+              <a:shade val="50000"/>
+            </a:schemeClr>
+          </a:lnRef>
+          <a:fillRef idx="1">
+            <a:schemeClr val="accent1"/>
+          </a:fillRef>
+          <a:effectRef idx="0">
+            <a:schemeClr val="accent1"/>
+          </a:effectRef>
+          <a:fontRef idx="minor">
+            <a:schemeClr val="lt1"/>
+          </a:fontRef>
+        </p:style>
+        <p:txBody>
+          <a:bodyPr rtlCol="0" anchor="ctr"/>
+          <a:lstStyle/>
+          <a:p>
+            <a:pPr algn="ctr"/>
+            <a:r>
+              <a:rPr lang="en-US" sz="800" dirty="0" smtClean="0">
+                <a:solidFill>
+                  <a:schemeClr val="tx1"/>
+                </a:solidFill>
+              </a:rPr>
+              <a:t>BrowserStackLocal.exe</a:t>
+            </a:r>
+            <a:endParaRPr lang="en-US" sz="800" dirty="0">
+              <a:solidFill>
+                <a:schemeClr val="tx1"/>
+              </a:solidFill>
+            </a:endParaRPr>
+          </a:p>
+        </p:txBody>
+      </p:sp>
+      <p:cxnSp>
+        <p:nvCxnSpPr>
+          <p:cNvPr id="29" name="Straight Arrow Connector 28"/>
+          <p:cNvCxnSpPr>
+            <a:stCxn id="7" idx="2"/>
+            <a:endCxn id="8" idx="0"/>
+          </p:cNvCxnSpPr>
+          <p:nvPr/>
+        </p:nvCxnSpPr>
+        <p:spPr>
+          <a:xfrm flipH="1">
+            <a:off x="4340881" y="3587697"/>
+            <a:ext cx="2519" cy="610229"/>
+          </a:xfrm>
+          <a:prstGeom prst="straightConnector1">
+            <a:avLst/>
+          </a:prstGeom>
+          <a:ln w="12700">
+            <a:solidFill>
+              <a:schemeClr val="tx1"/>
+            </a:solidFill>
+            <a:tailEnd type="arrow"/>
+          </a:ln>
+        </p:spPr>
+        <p:style>
+          <a:lnRef idx="1">
+            <a:schemeClr val="dk1"/>
+          </a:lnRef>
+          <a:fillRef idx="0">
+            <a:schemeClr val="dk1"/>
+          </a:fillRef>
+          <a:effectRef idx="0">
+            <a:schemeClr val="dk1"/>
+          </a:effectRef>
+          <a:fontRef idx="minor">
+            <a:schemeClr val="tx1"/>
+          </a:fontRef>
+        </p:style>
+      </p:cxnSp>
+      <p:sp>
+        <p:nvSpPr>
+          <p:cNvPr id="33" name="TextBox 32"/>
+          <p:cNvSpPr txBox="1"/>
+          <p:nvPr/>
+        </p:nvSpPr>
+        <p:spPr>
+          <a:xfrm>
+            <a:off x="4344030" y="3733800"/>
+            <a:ext cx="1473480" cy="338554"/>
+          </a:xfrm>
+          <a:prstGeom prst="rect">
+            <a:avLst/>
+          </a:prstGeom>
+          <a:noFill/>
+        </p:spPr>
+        <p:txBody>
+          <a:bodyPr wrap="none" rtlCol="0">
+            <a:spAutoFit/>
+          </a:bodyPr>
+          <a:lstStyle/>
+          <a:p>
+            <a:r>
+              <a:rPr lang="en-US" sz="800" dirty="0" smtClean="0"/>
+              <a:t>3. Parse request from app</a:t>
+            </a:r>
+          </a:p>
+          <a:p>
+            <a:r>
+              <a:rPr lang="en-US" sz="800" dirty="0" smtClean="0"/>
+              <a:t>4. Submit job request</a:t>
+            </a:r>
+            <a:endParaRPr lang="en-US" sz="800" dirty="0"/>
+          </a:p>
+        </p:txBody>
+      </p:sp>
+      <p:sp>
+        <p:nvSpPr>
+          <p:cNvPr id="37" name="TextBox 36"/>
+          <p:cNvSpPr txBox="1"/>
+          <p:nvPr/>
+        </p:nvSpPr>
+        <p:spPr>
+          <a:xfrm>
+            <a:off x="1467322" y="1981200"/>
+            <a:ext cx="1540806" cy="215444"/>
+          </a:xfrm>
+          <a:prstGeom prst="rect">
+            <a:avLst/>
+          </a:prstGeom>
+          <a:noFill/>
+        </p:spPr>
+        <p:txBody>
+          <a:bodyPr wrap="none" rtlCol="0">
+            <a:spAutoFit/>
+          </a:bodyPr>
+          <a:lstStyle/>
+          <a:p>
+            <a:r>
+              <a:rPr lang="en-US" sz="800" dirty="0" smtClean="0"/>
+              <a:t>1. /</a:t>
+            </a:r>
+            <a:r>
+              <a:rPr lang="en-US" sz="800" dirty="0" err="1" smtClean="0"/>
+              <a:t>moomoo</a:t>
+            </a:r>
+            <a:r>
+              <a:rPr lang="en-US" sz="800" dirty="0" smtClean="0"/>
+              <a:t> www.kbb.com</a:t>
+            </a:r>
+            <a:endParaRPr lang="en-US" sz="800" dirty="0"/>
+          </a:p>
+        </p:txBody>
+      </p:sp>
+      <p:cxnSp>
+        <p:nvCxnSpPr>
+          <p:cNvPr id="40" name="Elbow Connector 39"/>
+          <p:cNvCxnSpPr>
+            <a:stCxn id="19" idx="2"/>
+          </p:cNvCxnSpPr>
+          <p:nvPr/>
+        </p:nvCxnSpPr>
+        <p:spPr>
+          <a:xfrm rot="5400000" flipH="1" flipV="1">
+            <a:off x="2211689" y="2442809"/>
+            <a:ext cx="603302" cy="2131080"/>
+          </a:xfrm>
+          <a:prstGeom prst="bentConnector4">
+            <a:avLst>
+              <a:gd name="adj1" fmla="val -37891"/>
+              <a:gd name="adj2" fmla="val 63268"/>
+            </a:avLst>
+          </a:prstGeom>
+          <a:ln w="12700">
+            <a:solidFill>
+              <a:schemeClr val="tx1"/>
+            </a:solidFill>
             <a:tailEnd type="arrow"/>
           </a:ln>
         </p:spPr>
@@ -5322,21 +5806,56 @@
           </a:fontRef>
         </p:style>
       </p:cxnSp>
+      <p:sp>
+        <p:nvSpPr>
+          <p:cNvPr id="41" name="TextBox 40"/>
+          <p:cNvSpPr txBox="1"/>
+          <p:nvPr/>
+        </p:nvSpPr>
+        <p:spPr>
+          <a:xfrm>
+            <a:off x="812464" y="4175394"/>
+            <a:ext cx="2111475" cy="215444"/>
+          </a:xfrm>
+          <a:prstGeom prst="rect">
+            <a:avLst/>
+          </a:prstGeom>
+          <a:noFill/>
+        </p:spPr>
+        <p:txBody>
+          <a:bodyPr wrap="none" rtlCol="0">
+            <a:spAutoFit/>
+          </a:bodyPr>
+          <a:lstStyle/>
+          <a:p>
+            <a:r>
+              <a:rPr lang="en-US" sz="800" dirty="0" smtClean="0"/>
+              <a:t>2. Forward request to the Slack Service</a:t>
+            </a:r>
+            <a:endParaRPr lang="en-US" sz="800" dirty="0"/>
+          </a:p>
+        </p:txBody>
+      </p:sp>
       <p:cxnSp>
         <p:nvCxnSpPr>
-          <p:cNvPr id="28" name="Straight Arrow Connector 27"/>
-          <p:cNvCxnSpPr/>
+          <p:cNvPr id="55" name="Elbow Connector 54"/>
+          <p:cNvCxnSpPr>
+            <a:stCxn id="8" idx="3"/>
+          </p:cNvCxnSpPr>
           <p:nvPr/>
         </p:nvCxnSpPr>
         <p:spPr>
-          <a:xfrm>
-            <a:off x="2711083" y="638973"/>
-            <a:ext cx="0" cy="5229220"/>
+          <a:xfrm flipV="1">
+            <a:off x="5102881" y="1905000"/>
+            <a:ext cx="2654749" cy="2673926"/>
           </a:xfrm>
-          <a:prstGeom prst="straightConnector1">
+          <a:prstGeom prst="bentConnector2">
             <a:avLst/>
           </a:prstGeom>
-          <a:ln w="57150">
+          <a:ln w="12700">
+            <a:solidFill>
+              <a:schemeClr val="tx1"/>
+            </a:solidFill>
             <a:tailEnd type="arrow"/>
           </a:ln>
         </p:spPr>
@@ -5355,21 +5874,188 @@
           </a:fontRef>
         </p:style>
       </p:cxnSp>
+      <p:sp>
+        <p:nvSpPr>
+          <p:cNvPr id="64" name="TextBox 63"/>
+          <p:cNvSpPr txBox="1"/>
+          <p:nvPr/>
+        </p:nvSpPr>
+        <p:spPr>
+          <a:xfrm>
+            <a:off x="5941795" y="4648200"/>
+            <a:ext cx="2321469" cy="338554"/>
+          </a:xfrm>
+          <a:prstGeom prst="rect">
+            <a:avLst/>
+          </a:prstGeom>
+          <a:noFill/>
+        </p:spPr>
+        <p:txBody>
+          <a:bodyPr wrap="none" rtlCol="0">
+            <a:spAutoFit/>
+          </a:bodyPr>
+          <a:lstStyle/>
+          <a:p>
+            <a:r>
+              <a:rPr lang="en-US" sz="800" dirty="0" smtClean="0"/>
+              <a:t>5. Compile browsers to test</a:t>
+            </a:r>
+          </a:p>
+          <a:p>
+            <a:r>
+              <a:rPr lang="en-US" sz="800" dirty="0" smtClean="0"/>
+              <a:t>6. Submit job request to Browserstack.com</a:t>
+            </a:r>
+            <a:endParaRPr lang="en-US" sz="800" dirty="0"/>
+          </a:p>
+        </p:txBody>
+      </p:sp>
+      <p:grpSp>
+        <p:nvGrpSpPr>
+          <p:cNvPr id="98" name="Group 97"/>
+          <p:cNvGrpSpPr/>
+          <p:nvPr/>
+        </p:nvGrpSpPr>
+        <p:grpSpPr>
+          <a:xfrm>
+            <a:off x="5105400" y="1909762"/>
+            <a:ext cx="1828800" cy="1301698"/>
+            <a:chOff x="5105400" y="1909762"/>
+            <a:chExt cx="1828800" cy="1301698"/>
+          </a:xfrm>
+        </p:grpSpPr>
+        <p:cxnSp>
+          <p:nvCxnSpPr>
+            <p:cNvPr id="90" name="Straight Connector 89"/>
+            <p:cNvCxnSpPr/>
+            <p:nvPr/>
+          </p:nvCxnSpPr>
+          <p:spPr>
+            <a:xfrm>
+              <a:off x="6931819" y="1909762"/>
+              <a:ext cx="0" cy="1301698"/>
+            </a:xfrm>
+            <a:prstGeom prst="line">
+              <a:avLst/>
+            </a:prstGeom>
+            <a:ln w="12700">
+              <a:solidFill>
+                <a:schemeClr val="tx1"/>
+              </a:solidFill>
+            </a:ln>
+          </p:spPr>
+          <p:style>
+            <a:lnRef idx="1">
+              <a:schemeClr val="accent1"/>
+            </a:lnRef>
+            <a:fillRef idx="0">
+              <a:schemeClr val="accent1"/>
+            </a:fillRef>
+            <a:effectRef idx="0">
+              <a:schemeClr val="accent1"/>
+            </a:effectRef>
+            <a:fontRef idx="minor">
+              <a:schemeClr val="tx1"/>
+            </a:fontRef>
+          </p:style>
+        </p:cxnSp>
+        <p:cxnSp>
+          <p:nvCxnSpPr>
+            <p:cNvPr id="93" name="Straight Arrow Connector 92"/>
+            <p:cNvCxnSpPr>
+              <a:endCxn id="7" idx="3"/>
+            </p:cNvCxnSpPr>
+            <p:nvPr/>
+          </p:nvCxnSpPr>
+          <p:spPr>
+            <a:xfrm flipH="1">
+              <a:off x="5105400" y="3206697"/>
+              <a:ext cx="1828800" cy="0"/>
+            </a:xfrm>
+            <a:prstGeom prst="straightConnector1">
+              <a:avLst/>
+            </a:prstGeom>
+            <a:ln w="12700">
+              <a:solidFill>
+                <a:schemeClr val="tx1"/>
+              </a:solidFill>
+              <a:tailEnd type="arrow"/>
+            </a:ln>
+          </p:spPr>
+          <p:style>
+            <a:lnRef idx="1">
+              <a:schemeClr val="accent1"/>
+            </a:lnRef>
+            <a:fillRef idx="0">
+              <a:schemeClr val="accent1"/>
+            </a:fillRef>
+            <a:effectRef idx="0">
+              <a:schemeClr val="accent1"/>
+            </a:effectRef>
+            <a:fontRef idx="minor">
+              <a:schemeClr val="tx1"/>
+            </a:fontRef>
+          </p:style>
+        </p:cxnSp>
+      </p:grpSp>
+      <p:sp>
+        <p:nvSpPr>
+          <p:cNvPr id="100" name="TextBox 99"/>
+          <p:cNvSpPr txBox="1"/>
+          <p:nvPr/>
+        </p:nvSpPr>
+        <p:spPr>
+          <a:xfrm>
+            <a:off x="5872521" y="3242846"/>
+            <a:ext cx="1899879" cy="338554"/>
+          </a:xfrm>
+          <a:prstGeom prst="rect">
+            <a:avLst/>
+          </a:prstGeom>
+          <a:noFill/>
+        </p:spPr>
+        <p:txBody>
+          <a:bodyPr wrap="none" rtlCol="0">
+            <a:spAutoFit/>
+          </a:bodyPr>
+          <a:lstStyle/>
+          <a:p>
+            <a:r>
+              <a:rPr lang="en-US" sz="800" dirty="0" smtClean="0"/>
+              <a:t>7. Job Complete</a:t>
+            </a:r>
+          </a:p>
+          <a:p>
+            <a:r>
+              <a:rPr lang="en-US" sz="800" dirty="0" smtClean="0"/>
+              <a:t>8. Send job details to slack service</a:t>
+            </a:r>
+            <a:endParaRPr lang="en-US" sz="800" dirty="0"/>
+          </a:p>
+        </p:txBody>
+      </p:sp>
       <p:cxnSp>
         <p:nvCxnSpPr>
-          <p:cNvPr id="29" name="Straight Arrow Connector 28"/>
-          <p:cNvCxnSpPr/>
+          <p:cNvPr id="103" name="Elbow Connector 102"/>
+          <p:cNvCxnSpPr>
+            <a:endCxn id="10" idx="3"/>
+          </p:cNvCxnSpPr>
           <p:nvPr/>
         </p:nvCxnSpPr>
         <p:spPr>
-          <a:xfrm>
-            <a:off x="5105400" y="638973"/>
-            <a:ext cx="0" cy="5229220"/>
+          <a:xfrm rot="10800000">
+            <a:off x="2209800" y="1562100"/>
+            <a:ext cx="2917015" cy="1485904"/>
           </a:xfrm>
-          <a:prstGeom prst="straightConnector1">
-            <a:avLst/>
+          <a:prstGeom prst="bentConnector3">
+            <a:avLst>
+              <a:gd name="adj1" fmla="val -32124"/>
+            </a:avLst>
           </a:prstGeom>
-          <a:ln w="57150">
+          <a:ln w="12700">
+            <a:solidFill>
+              <a:schemeClr val="tx1"/>
+            </a:solidFill>
             <a:tailEnd type="arrow"/>
           </a:ln>
         </p:spPr>
@@ -5388,49 +6074,16 @@
           </a:fontRef>
         </p:style>
       </p:cxnSp>
-      <p:cxnSp>
-        <p:nvCxnSpPr>
-          <p:cNvPr id="30" name="Straight Arrow Connector 29"/>
-          <p:cNvCxnSpPr/>
+      <p:sp>
+        <p:nvSpPr>
+          <p:cNvPr id="113" name="TextBox 112"/>
+          <p:cNvSpPr txBox="1"/>
           <p:nvPr/>
-        </p:nvCxnSpPr>
+        </p:nvSpPr>
         <p:spPr>
           <a:xfrm>
-            <a:off x="7162800" y="638973"/>
-            <a:ext cx="0" cy="5229220"/>
-          </a:xfrm>
-          <a:prstGeom prst="straightConnector1">
-            <a:avLst/>
-          </a:prstGeom>
-          <a:ln w="57150">
-            <a:tailEnd type="arrow"/>
-          </a:ln>
-        </p:spPr>
-        <p:style>
-          <a:lnRef idx="1">
-            <a:schemeClr val="accent1"/>
-          </a:lnRef>
-          <a:fillRef idx="0">
-            <a:schemeClr val="accent1"/>
-          </a:fillRef>
-          <a:effectRef idx="0">
-            <a:schemeClr val="accent1"/>
-          </a:effectRef>
-          <a:fontRef idx="minor">
-            <a:schemeClr val="tx1"/>
-          </a:fontRef>
-        </p:style>
-      </p:cxnSp>
-      <p:sp>
-        <p:nvSpPr>
-          <p:cNvPr id="2" name="TextBox 1"/>
-          <p:cNvSpPr txBox="1"/>
-          <p:nvPr/>
-        </p:nvSpPr>
-        <p:spPr>
-          <a:xfrm>
-            <a:off x="838200" y="685800"/>
-            <a:ext cx="1513556" cy="230832"/>
+            <a:off x="3886200" y="1308556"/>
+            <a:ext cx="1571264" cy="215444"/>
           </a:xfrm>
           <a:prstGeom prst="rect">
             <a:avLst/>
@@ -5444,649 +6097,17 @@
           <a:lstStyle/>
           <a:p>
             <a:r>
-              <a:rPr lang="en-US" sz="900" b="1" dirty="0" smtClean="0"/>
-              <a:t>/</a:t>
-            </a:r>
-            <a:r>
-              <a:rPr lang="en-US" sz="900" b="1" dirty="0" err="1" smtClean="0"/>
-              <a:t>ss</a:t>
-            </a:r>
-            <a:r>
-              <a:rPr lang="en-US" sz="900" b="1" dirty="0" smtClean="0"/>
-              <a:t> test01.dev.kbb.com</a:t>
-            </a:r>
-            <a:endParaRPr lang="en-US" sz="900" b="1" dirty="0"/>
-          </a:p>
-        </p:txBody>
-      </p:sp>
-      <p:sp>
-        <p:nvSpPr>
-          <p:cNvPr id="11" name="TextBox 10"/>
-          <p:cNvSpPr txBox="1"/>
-          <p:nvPr/>
-        </p:nvSpPr>
-        <p:spPr>
-          <a:xfrm>
-            <a:off x="3155368" y="1219200"/>
-            <a:ext cx="1340432" cy="230832"/>
-          </a:xfrm>
-          <a:prstGeom prst="rect">
-            <a:avLst/>
-          </a:prstGeom>
-          <a:noFill/>
-        </p:spPr>
-        <p:txBody>
-          <a:bodyPr wrap="none" rtlCol="0">
-            <a:spAutoFit/>
-          </a:bodyPr>
-          <a:lstStyle/>
-          <a:p>
-            <a:r>
-              <a:rPr lang="en-US" sz="900" b="1" dirty="0" smtClean="0"/>
-              <a:t>Request screenshots</a:t>
-            </a:r>
-            <a:endParaRPr lang="en-US" sz="900" b="1" dirty="0"/>
-          </a:p>
-        </p:txBody>
-      </p:sp>
-      <p:sp>
-        <p:nvSpPr>
-          <p:cNvPr id="12" name="TextBox 11"/>
-          <p:cNvSpPr txBox="1"/>
-          <p:nvPr/>
-        </p:nvSpPr>
-        <p:spPr>
-          <a:xfrm>
-            <a:off x="5410200" y="1600200"/>
-            <a:ext cx="1438214" cy="230832"/>
-          </a:xfrm>
-          <a:prstGeom prst="rect">
-            <a:avLst/>
-          </a:prstGeom>
-          <a:noFill/>
-        </p:spPr>
-        <p:txBody>
-          <a:bodyPr wrap="none" rtlCol="0">
-            <a:spAutoFit/>
-          </a:bodyPr>
-          <a:lstStyle/>
-          <a:p>
-            <a:r>
-              <a:rPr lang="en-US" sz="900" b="1" dirty="0" smtClean="0"/>
-              <a:t>Submit screenshot job</a:t>
-            </a:r>
-            <a:endParaRPr lang="en-US" sz="900" b="1" dirty="0"/>
-          </a:p>
-        </p:txBody>
-      </p:sp>
-      <p:sp>
-        <p:nvSpPr>
-          <p:cNvPr id="13" name="TextBox 12"/>
-          <p:cNvSpPr txBox="1"/>
-          <p:nvPr/>
-        </p:nvSpPr>
-        <p:spPr>
-          <a:xfrm>
-            <a:off x="7315200" y="2207568"/>
-            <a:ext cx="1396536" cy="230832"/>
-          </a:xfrm>
-          <a:prstGeom prst="rect">
-            <a:avLst/>
-          </a:prstGeom>
-          <a:noFill/>
-        </p:spPr>
-        <p:txBody>
-          <a:bodyPr wrap="none" rtlCol="0">
-            <a:spAutoFit/>
-          </a:bodyPr>
-          <a:lstStyle/>
-          <a:p>
-            <a:r>
-              <a:rPr lang="en-US" sz="900" b="1" dirty="0" smtClean="0"/>
-              <a:t>Generate Screenshots</a:t>
-            </a:r>
-            <a:endParaRPr lang="en-US" sz="900" b="1" dirty="0"/>
-          </a:p>
-        </p:txBody>
-      </p:sp>
-      <p:sp>
-        <p:nvSpPr>
-          <p:cNvPr id="14" name="TextBox 13"/>
-          <p:cNvSpPr txBox="1"/>
-          <p:nvPr/>
-        </p:nvSpPr>
-        <p:spPr>
-          <a:xfrm>
-            <a:off x="5562600" y="2362200"/>
-            <a:ext cx="1183337" cy="369332"/>
-          </a:xfrm>
-          <a:prstGeom prst="rect">
-            <a:avLst/>
-          </a:prstGeom>
-          <a:noFill/>
-        </p:spPr>
-        <p:txBody>
-          <a:bodyPr wrap="none" rtlCol="0">
-            <a:spAutoFit/>
-          </a:bodyPr>
-          <a:lstStyle/>
-          <a:p>
-            <a:r>
-              <a:rPr lang="en-US" sz="900" b="1" dirty="0" smtClean="0"/>
-              <a:t>poll for job status</a:t>
-            </a:r>
-          </a:p>
-          <a:p>
-            <a:r>
-              <a:rPr lang="en-US" sz="900" b="1" dirty="0" smtClean="0"/>
-              <a:t>every 3 seconds</a:t>
-            </a:r>
-            <a:endParaRPr lang="en-US" sz="900" b="1" dirty="0"/>
-          </a:p>
-        </p:txBody>
-      </p:sp>
-      <p:sp>
-        <p:nvSpPr>
-          <p:cNvPr id="15" name="TextBox 14"/>
-          <p:cNvSpPr txBox="1"/>
-          <p:nvPr/>
-        </p:nvSpPr>
-        <p:spPr>
-          <a:xfrm>
-            <a:off x="7239000" y="3124200"/>
-            <a:ext cx="1638590" cy="230832"/>
-          </a:xfrm>
-          <a:prstGeom prst="rect">
-            <a:avLst/>
-          </a:prstGeom>
-          <a:noFill/>
-        </p:spPr>
-        <p:txBody>
-          <a:bodyPr wrap="none" rtlCol="0">
-            <a:spAutoFit/>
-          </a:bodyPr>
-          <a:lstStyle/>
-          <a:p>
-            <a:r>
-              <a:rPr lang="en-US" sz="900" b="1" dirty="0" smtClean="0"/>
-              <a:t>All screenshots generated</a:t>
-            </a:r>
-            <a:endParaRPr lang="en-US" sz="900" b="1" dirty="0"/>
-          </a:p>
-        </p:txBody>
-      </p:sp>
-      <p:sp>
-        <p:nvSpPr>
-          <p:cNvPr id="16" name="TextBox 15"/>
-          <p:cNvSpPr txBox="1"/>
-          <p:nvPr/>
-        </p:nvSpPr>
-        <p:spPr>
-          <a:xfrm>
-            <a:off x="2895600" y="3883968"/>
-            <a:ext cx="2068195" cy="230832"/>
-          </a:xfrm>
-          <a:prstGeom prst="rect">
-            <a:avLst/>
-          </a:prstGeom>
-          <a:noFill/>
-        </p:spPr>
-        <p:txBody>
-          <a:bodyPr wrap="none" rtlCol="0">
-            <a:spAutoFit/>
-          </a:bodyPr>
-          <a:lstStyle/>
-          <a:p>
-            <a:r>
-              <a:rPr lang="en-US" sz="900" b="1" dirty="0" smtClean="0"/>
-              <a:t>Send screenshot </a:t>
-            </a:r>
-            <a:r>
-              <a:rPr lang="en-US" sz="900" b="1" dirty="0" err="1" smtClean="0"/>
-              <a:t>urls</a:t>
-            </a:r>
-            <a:r>
-              <a:rPr lang="en-US" sz="900" b="1" dirty="0" smtClean="0"/>
-              <a:t> to slack app</a:t>
-            </a:r>
-            <a:endParaRPr lang="en-US" sz="900" b="1" dirty="0"/>
-          </a:p>
-        </p:txBody>
-      </p:sp>
-      <p:sp>
-        <p:nvSpPr>
-          <p:cNvPr id="21" name="TextBox 20"/>
-          <p:cNvSpPr txBox="1"/>
-          <p:nvPr/>
-        </p:nvSpPr>
-        <p:spPr>
-          <a:xfrm>
-            <a:off x="990600" y="4292769"/>
-            <a:ext cx="1524000" cy="507831"/>
-          </a:xfrm>
-          <a:prstGeom prst="rect">
-            <a:avLst/>
-          </a:prstGeom>
-          <a:noFill/>
-        </p:spPr>
-        <p:txBody>
-          <a:bodyPr wrap="square" rtlCol="0">
-            <a:spAutoFit/>
-          </a:bodyPr>
-          <a:lstStyle/>
-          <a:p>
-            <a:r>
-              <a:rPr lang="en-US" sz="900" b="1" dirty="0" smtClean="0"/>
-              <a:t>Post message with screenshot </a:t>
-            </a:r>
-            <a:r>
-              <a:rPr lang="en-US" sz="900" b="1" dirty="0" err="1" smtClean="0"/>
-              <a:t>urls</a:t>
-            </a:r>
-            <a:r>
-              <a:rPr lang="en-US" sz="900" b="1" dirty="0" smtClean="0"/>
-              <a:t> to channel</a:t>
-            </a:r>
-            <a:endParaRPr lang="en-US" sz="900" b="1" dirty="0"/>
-          </a:p>
-        </p:txBody>
-      </p:sp>
-      <p:cxnSp>
-        <p:nvCxnSpPr>
-          <p:cNvPr id="4" name="Straight Arrow Connector 3"/>
-          <p:cNvCxnSpPr/>
-          <p:nvPr/>
-        </p:nvCxnSpPr>
-        <p:spPr>
-          <a:xfrm>
-            <a:off x="571500" y="838200"/>
-            <a:ext cx="2139583" cy="266700"/>
-          </a:xfrm>
-          <a:prstGeom prst="straightConnector1">
-            <a:avLst/>
-          </a:prstGeom>
-          <a:ln>
-            <a:tailEnd type="arrow"/>
-          </a:ln>
-        </p:spPr>
-        <p:style>
-          <a:lnRef idx="1">
-            <a:schemeClr val="accent1"/>
-          </a:lnRef>
-          <a:fillRef idx="0">
-            <a:schemeClr val="accent1"/>
-          </a:fillRef>
-          <a:effectRef idx="0">
-            <a:schemeClr val="accent1"/>
-          </a:effectRef>
-          <a:fontRef idx="minor">
-            <a:schemeClr val="tx1"/>
-          </a:fontRef>
-        </p:style>
-      </p:cxnSp>
-      <p:cxnSp>
-        <p:nvCxnSpPr>
-          <p:cNvPr id="23" name="Straight Arrow Connector 22"/>
-          <p:cNvCxnSpPr/>
-          <p:nvPr/>
-        </p:nvCxnSpPr>
-        <p:spPr>
-          <a:xfrm>
-            <a:off x="2705100" y="1370484"/>
-            <a:ext cx="2400300" cy="266700"/>
-          </a:xfrm>
-          <a:prstGeom prst="straightConnector1">
-            <a:avLst/>
-          </a:prstGeom>
-          <a:ln>
-            <a:tailEnd type="arrow"/>
-          </a:ln>
-        </p:spPr>
-        <p:style>
-          <a:lnRef idx="1">
-            <a:schemeClr val="accent1"/>
-          </a:lnRef>
-          <a:fillRef idx="0">
-            <a:schemeClr val="accent1"/>
-          </a:fillRef>
-          <a:effectRef idx="0">
-            <a:schemeClr val="accent1"/>
-          </a:effectRef>
-          <a:fontRef idx="minor">
-            <a:schemeClr val="tx1"/>
-          </a:fontRef>
-        </p:style>
-      </p:cxnSp>
-      <p:cxnSp>
-        <p:nvCxnSpPr>
-          <p:cNvPr id="26" name="Straight Arrow Connector 25"/>
-          <p:cNvCxnSpPr/>
-          <p:nvPr/>
-        </p:nvCxnSpPr>
-        <p:spPr>
-          <a:xfrm>
-            <a:off x="5105400" y="1751484"/>
-            <a:ext cx="2057400" cy="229716"/>
-          </a:xfrm>
-          <a:prstGeom prst="straightConnector1">
-            <a:avLst/>
-          </a:prstGeom>
-          <a:ln>
-            <a:tailEnd type="arrow"/>
-          </a:ln>
-        </p:spPr>
-        <p:style>
-          <a:lnRef idx="1">
-            <a:schemeClr val="accent1"/>
-          </a:lnRef>
-          <a:fillRef idx="0">
-            <a:schemeClr val="accent1"/>
-          </a:fillRef>
-          <a:effectRef idx="0">
-            <a:schemeClr val="accent1"/>
-          </a:effectRef>
-          <a:fontRef idx="minor">
-            <a:schemeClr val="tx1"/>
-          </a:fontRef>
-        </p:style>
-      </p:cxnSp>
-      <p:cxnSp>
-        <p:nvCxnSpPr>
-          <p:cNvPr id="31" name="Straight Arrow Connector 30"/>
-          <p:cNvCxnSpPr/>
-          <p:nvPr/>
-        </p:nvCxnSpPr>
-        <p:spPr>
-          <a:xfrm>
-            <a:off x="5105400" y="2628342"/>
-            <a:ext cx="2057400" cy="267258"/>
-          </a:xfrm>
-          <a:prstGeom prst="straightConnector1">
-            <a:avLst/>
-          </a:prstGeom>
-          <a:ln>
-            <a:tailEnd type="arrow"/>
-          </a:ln>
-        </p:spPr>
-        <p:style>
-          <a:lnRef idx="1">
-            <a:schemeClr val="accent1"/>
-          </a:lnRef>
-          <a:fillRef idx="0">
-            <a:schemeClr val="accent1"/>
-          </a:fillRef>
-          <a:effectRef idx="0">
-            <a:schemeClr val="accent1"/>
-          </a:effectRef>
-          <a:fontRef idx="minor">
-            <a:schemeClr val="tx1"/>
-          </a:fontRef>
-        </p:style>
-      </p:cxnSp>
-      <p:cxnSp>
-        <p:nvCxnSpPr>
-          <p:cNvPr id="34" name="Straight Arrow Connector 33"/>
-          <p:cNvCxnSpPr/>
-          <p:nvPr/>
-        </p:nvCxnSpPr>
-        <p:spPr>
-          <a:xfrm flipH="1">
-            <a:off x="5105400" y="3620616"/>
-            <a:ext cx="2057400" cy="265584"/>
-          </a:xfrm>
-          <a:prstGeom prst="straightConnector1">
-            <a:avLst/>
-          </a:prstGeom>
-          <a:ln>
-            <a:tailEnd type="arrow"/>
-          </a:ln>
-        </p:spPr>
-        <p:style>
-          <a:lnRef idx="1">
-            <a:schemeClr val="accent1"/>
-          </a:lnRef>
-          <a:fillRef idx="0">
-            <a:schemeClr val="accent1"/>
-          </a:fillRef>
-          <a:effectRef idx="0">
-            <a:schemeClr val="accent1"/>
-          </a:effectRef>
-          <a:fontRef idx="minor">
-            <a:schemeClr val="tx1"/>
-          </a:fontRef>
-        </p:style>
-      </p:cxnSp>
-      <p:sp>
-        <p:nvSpPr>
-          <p:cNvPr id="36" name="TextBox 35"/>
-          <p:cNvSpPr txBox="1"/>
-          <p:nvPr/>
-        </p:nvSpPr>
-        <p:spPr>
-          <a:xfrm>
-            <a:off x="5398946" y="3502968"/>
-            <a:ext cx="1459054" cy="230832"/>
-          </a:xfrm>
-          <a:prstGeom prst="rect">
-            <a:avLst/>
-          </a:prstGeom>
-          <a:noFill/>
-        </p:spPr>
-        <p:txBody>
-          <a:bodyPr wrap="none" rtlCol="0">
-            <a:spAutoFit/>
-          </a:bodyPr>
-          <a:lstStyle/>
-          <a:p>
-            <a:r>
-              <a:rPr lang="en-US" sz="900" b="1" dirty="0" smtClean="0"/>
-              <a:t>All image </a:t>
-            </a:r>
-            <a:r>
-              <a:rPr lang="en-US" sz="900" b="1" dirty="0" err="1" smtClean="0"/>
-              <a:t>urls</a:t>
-            </a:r>
-            <a:r>
-              <a:rPr lang="en-US" sz="900" b="1" dirty="0" smtClean="0"/>
-              <a:t> received</a:t>
-            </a:r>
-            <a:endParaRPr lang="en-US" sz="900" b="1" dirty="0"/>
-          </a:p>
-        </p:txBody>
-      </p:sp>
-      <p:cxnSp>
-        <p:nvCxnSpPr>
-          <p:cNvPr id="37" name="Straight Arrow Connector 36"/>
-          <p:cNvCxnSpPr/>
-          <p:nvPr/>
-        </p:nvCxnSpPr>
-        <p:spPr>
-          <a:xfrm flipH="1">
-            <a:off x="2705100" y="4041119"/>
-            <a:ext cx="2379518" cy="302281"/>
-          </a:xfrm>
-          <a:prstGeom prst="straightConnector1">
-            <a:avLst/>
-          </a:prstGeom>
-          <a:ln>
-            <a:tailEnd type="arrow"/>
-          </a:ln>
-        </p:spPr>
-        <p:style>
-          <a:lnRef idx="1">
-            <a:schemeClr val="accent1"/>
-          </a:lnRef>
-          <a:fillRef idx="0">
-            <a:schemeClr val="accent1"/>
-          </a:fillRef>
-          <a:effectRef idx="0">
-            <a:schemeClr val="accent1"/>
-          </a:effectRef>
-          <a:fontRef idx="minor">
-            <a:schemeClr val="tx1"/>
-          </a:fontRef>
-        </p:style>
-      </p:cxnSp>
-      <p:cxnSp>
-        <p:nvCxnSpPr>
-          <p:cNvPr id="39" name="Straight Arrow Connector 38"/>
-          <p:cNvCxnSpPr/>
-          <p:nvPr/>
-        </p:nvCxnSpPr>
-        <p:spPr>
-          <a:xfrm flipH="1">
-            <a:off x="571501" y="4648200"/>
-            <a:ext cx="2130450" cy="314727"/>
-          </a:xfrm>
-          <a:prstGeom prst="straightConnector1">
-            <a:avLst/>
-          </a:prstGeom>
-          <a:ln>
-            <a:tailEnd type="arrow"/>
-          </a:ln>
-        </p:spPr>
-        <p:style>
-          <a:lnRef idx="1">
-            <a:schemeClr val="accent1"/>
-          </a:lnRef>
-          <a:fillRef idx="0">
-            <a:schemeClr val="accent1"/>
-          </a:fillRef>
-          <a:effectRef idx="0">
-            <a:schemeClr val="accent1"/>
-          </a:effectRef>
-          <a:fontRef idx="minor">
-            <a:schemeClr val="tx1"/>
-          </a:fontRef>
-        </p:style>
-      </p:cxnSp>
-      <p:cxnSp>
-        <p:nvCxnSpPr>
-          <p:cNvPr id="63" name="Straight Connector 62"/>
-          <p:cNvCxnSpPr/>
-          <p:nvPr/>
-        </p:nvCxnSpPr>
-        <p:spPr>
-          <a:xfrm>
-            <a:off x="7162800" y="2133600"/>
-            <a:ext cx="1828800" cy="0"/>
-          </a:xfrm>
-          <a:prstGeom prst="line">
-            <a:avLst/>
-          </a:prstGeom>
-        </p:spPr>
-        <p:style>
-          <a:lnRef idx="1">
-            <a:schemeClr val="accent1"/>
-          </a:lnRef>
-          <a:fillRef idx="0">
-            <a:schemeClr val="accent1"/>
-          </a:fillRef>
-          <a:effectRef idx="0">
-            <a:schemeClr val="accent1"/>
-          </a:effectRef>
-          <a:fontRef idx="minor">
-            <a:schemeClr val="tx1"/>
-          </a:fontRef>
-        </p:style>
-      </p:cxnSp>
-      <p:cxnSp>
-        <p:nvCxnSpPr>
-          <p:cNvPr id="66" name="Straight Connector 65"/>
-          <p:cNvCxnSpPr/>
-          <p:nvPr/>
-        </p:nvCxnSpPr>
-        <p:spPr>
-          <a:xfrm>
-            <a:off x="8991600" y="2133600"/>
-            <a:ext cx="0" cy="1334616"/>
-          </a:xfrm>
-          <a:prstGeom prst="line">
-            <a:avLst/>
-          </a:prstGeom>
-        </p:spPr>
-        <p:style>
-          <a:lnRef idx="1">
-            <a:schemeClr val="accent1"/>
-          </a:lnRef>
-          <a:fillRef idx="0">
-            <a:schemeClr val="accent1"/>
-          </a:fillRef>
-          <a:effectRef idx="0">
-            <a:schemeClr val="accent1"/>
-          </a:effectRef>
-          <a:fontRef idx="minor">
-            <a:schemeClr val="tx1"/>
-          </a:fontRef>
-        </p:style>
-      </p:cxnSp>
-      <p:cxnSp>
-        <p:nvCxnSpPr>
-          <p:cNvPr id="74" name="Straight Arrow Connector 73"/>
-          <p:cNvCxnSpPr/>
-          <p:nvPr/>
-        </p:nvCxnSpPr>
-        <p:spPr>
-          <a:xfrm>
-            <a:off x="8013468" y="2514600"/>
-            <a:ext cx="0" cy="533400"/>
-          </a:xfrm>
-          <a:prstGeom prst="straightConnector1">
-            <a:avLst/>
-          </a:prstGeom>
-          <a:ln>
-            <a:tailEnd type="arrow"/>
-          </a:ln>
-        </p:spPr>
-        <p:style>
-          <a:lnRef idx="1">
-            <a:schemeClr val="accent1"/>
-          </a:lnRef>
-          <a:fillRef idx="0">
-            <a:schemeClr val="accent1"/>
-          </a:fillRef>
-          <a:effectRef idx="0">
-            <a:schemeClr val="accent1"/>
-          </a:effectRef>
-          <a:fontRef idx="minor">
-            <a:schemeClr val="tx1"/>
-          </a:fontRef>
-        </p:style>
-      </p:cxnSp>
-      <p:cxnSp>
-        <p:nvCxnSpPr>
-          <p:cNvPr id="77" name="Straight Connector 76"/>
-          <p:cNvCxnSpPr/>
-          <p:nvPr/>
-        </p:nvCxnSpPr>
-        <p:spPr>
-          <a:xfrm>
-            <a:off x="7162800" y="3468216"/>
-            <a:ext cx="1828800" cy="0"/>
-          </a:xfrm>
-          <a:prstGeom prst="line">
-            <a:avLst/>
-          </a:prstGeom>
-        </p:spPr>
-        <p:style>
-          <a:lnRef idx="1">
-            <a:schemeClr val="accent1"/>
-          </a:lnRef>
-          <a:fillRef idx="0">
-            <a:schemeClr val="accent1"/>
-          </a:fillRef>
-          <a:effectRef idx="0">
-            <a:schemeClr val="accent1"/>
-          </a:effectRef>
-          <a:fontRef idx="minor">
-            <a:schemeClr val="tx1"/>
-          </a:fontRef>
-        </p:style>
-      </p:cxnSp>
+              <a:rPr lang="en-US" sz="800" dirty="0" smtClean="0"/>
+              <a:t>9. Post screenshots to Slack</a:t>
+            </a:r>
+            <a:endParaRPr lang="en-US" sz="800" dirty="0"/>
+          </a:p>
+        </p:txBody>
+      </p:sp>
     </p:spTree>
     <p:extLst>
       <p:ext uri="{BB962C8B-B14F-4D97-AF65-F5344CB8AC3E}">
-        <p14:creationId xmlns:p14="http://schemas.microsoft.com/office/powerpoint/2010/main" val="3136853472"/>
+        <p14:creationId xmlns:p14="http://schemas.microsoft.com/office/powerpoint/2010/main" val="699963470"/>
       </p:ext>
     </p:extLst>
   </p:cSld>
@@ -6114,7 +6135,7 @@
                             </p:stCondLst>
                             <p:childTnLst>
                               <p:par>
-                                <p:cTn id="5" presetID="1" presetClass="entr" presetSubtype="0" fill="hold" grpId="0" nodeType="clickEffect">
+                                <p:cTn id="5" presetID="10" presetClass="entr" presetSubtype="0" fill="hold" grpId="0" nodeType="clickEffect">
                                   <p:stCondLst>
                                     <p:cond delay="0"/>
                                   </p:stCondLst>
@@ -6127,7 +6148,7 @@
                                           </p:stCondLst>
                                         </p:cTn>
                                         <p:tgtEl>
-                                          <p:spTgt spid="17"/>
+                                          <p:spTgt spid="37"/>
                                         </p:tgtEl>
                                         <p:attrNameLst>
                                           <p:attrName>style.visibility</p:attrName>
@@ -6137,42 +6158,32 @@
                                         <p:strVal val="visible"/>
                                       </p:to>
                                     </p:set>
+                                    <p:animEffect transition="in" filter="fade">
+                                      <p:cBhvr>
+                                        <p:cTn id="7" dur="500"/>
+                                        <p:tgtEl>
+                                          <p:spTgt spid="37"/>
+                                        </p:tgtEl>
+                                      </p:cBhvr>
+                                    </p:animEffect>
                                   </p:childTnLst>
                                 </p:cTn>
                               </p:par>
-                            </p:childTnLst>
-                          </p:cTn>
-                        </p:par>
-                      </p:childTnLst>
-                    </p:cTn>
-                  </p:par>
-                  <p:par>
-                    <p:cTn id="7" fill="hold">
-                      <p:stCondLst>
-                        <p:cond delay="indefinite"/>
-                      </p:stCondLst>
-                      <p:childTnLst>
-                        <p:par>
-                          <p:cTn id="8" fill="hold">
-                            <p:stCondLst>
-                              <p:cond delay="0"/>
-                            </p:stCondLst>
-                            <p:childTnLst>
                               <p:par>
-                                <p:cTn id="9" presetID="1" presetClass="entr" presetSubtype="0" fill="hold" grpId="0" nodeType="clickEffect">
+                                <p:cTn id="8" presetID="10" presetClass="entr" presetSubtype="0" fill="hold" nodeType="withEffect">
                                   <p:stCondLst>
                                     <p:cond delay="0"/>
                                   </p:stCondLst>
                                   <p:childTnLst>
                                     <p:set>
                                       <p:cBhvr>
-                                        <p:cTn id="10" dur="1" fill="hold">
+                                        <p:cTn id="9" dur="1" fill="hold">
                                           <p:stCondLst>
                                             <p:cond delay="0"/>
                                           </p:stCondLst>
                                         </p:cTn>
                                         <p:tgtEl>
-                                          <p:spTgt spid="18"/>
+                                          <p:spTgt spid="23"/>
                                         </p:tgtEl>
                                         <p:attrNameLst>
                                           <p:attrName>style.visibility</p:attrName>
@@ -6182,6 +6193,14 @@
                                         <p:strVal val="visible"/>
                                       </p:to>
                                     </p:set>
+                                    <p:animEffect transition="in" filter="fade">
+                                      <p:cBhvr>
+                                        <p:cTn id="10" dur="500"/>
+                                        <p:tgtEl>
+                                          <p:spTgt spid="23"/>
+                                        </p:tgtEl>
+                                      </p:cBhvr>
+                                    </p:animEffect>
                                   </p:childTnLst>
                                 </p:cTn>
                               </p:par>
@@ -6204,7 +6223,7 @@
                             </p:stCondLst>
                             <p:childTnLst>
                               <p:par>
-                                <p:cTn id="13" presetID="1" presetClass="entr" presetSubtype="0" fill="hold" grpId="0" nodeType="clickEffect">
+                                <p:cTn id="13" presetID="10" presetClass="entr" presetSubtype="0" fill="hold" nodeType="clickEffect">
                                   <p:stCondLst>
                                     <p:cond delay="0"/>
                                   </p:stCondLst>
@@ -6217,7 +6236,7 @@
                                           </p:stCondLst>
                                         </p:cTn>
                                         <p:tgtEl>
-                                          <p:spTgt spid="19"/>
+                                          <p:spTgt spid="40"/>
                                         </p:tgtEl>
                                         <p:attrNameLst>
                                           <p:attrName>style.visibility</p:attrName>
@@ -6227,42 +6246,32 @@
                                         <p:strVal val="visible"/>
                                       </p:to>
                                     </p:set>
+                                    <p:animEffect transition="in" filter="fade">
+                                      <p:cBhvr>
+                                        <p:cTn id="15" dur="500"/>
+                                        <p:tgtEl>
+                                          <p:spTgt spid="40"/>
+                                        </p:tgtEl>
+                                      </p:cBhvr>
+                                    </p:animEffect>
                                   </p:childTnLst>
                                 </p:cTn>
                               </p:par>
-                            </p:childTnLst>
-                          </p:cTn>
-                        </p:par>
-                      </p:childTnLst>
-                    </p:cTn>
-                  </p:par>
-                  <p:par>
-                    <p:cTn id="15" fill="hold">
-                      <p:stCondLst>
-                        <p:cond delay="indefinite"/>
-                      </p:stCondLst>
-                      <p:childTnLst>
-                        <p:par>
-                          <p:cTn id="16" fill="hold">
-                            <p:stCondLst>
-                              <p:cond delay="0"/>
-                            </p:stCondLst>
-                            <p:childTnLst>
                               <p:par>
-                                <p:cTn id="17" presetID="1" presetClass="entr" presetSubtype="0" fill="hold" grpId="0" nodeType="clickEffect">
+                                <p:cTn id="16" presetID="10" presetClass="entr" presetSubtype="0" fill="hold" grpId="0" nodeType="withEffect">
                                   <p:stCondLst>
                                     <p:cond delay="0"/>
                                   </p:stCondLst>
                                   <p:childTnLst>
                                     <p:set>
                                       <p:cBhvr>
-                                        <p:cTn id="18" dur="1" fill="hold">
+                                        <p:cTn id="17" dur="1" fill="hold">
                                           <p:stCondLst>
                                             <p:cond delay="0"/>
                                           </p:stCondLst>
                                         </p:cTn>
                                         <p:tgtEl>
-                                          <p:spTgt spid="20"/>
+                                          <p:spTgt spid="41"/>
                                         </p:tgtEl>
                                         <p:attrNameLst>
                                           <p:attrName>style.visibility</p:attrName>
@@ -6272,6 +6281,14 @@
                                         <p:strVal val="visible"/>
                                       </p:to>
                                     </p:set>
+                                    <p:animEffect transition="in" filter="fade">
+                                      <p:cBhvr>
+                                        <p:cTn id="18" dur="500"/>
+                                        <p:tgtEl>
+                                          <p:spTgt spid="41"/>
+                                        </p:tgtEl>
+                                      </p:cBhvr>
+                                    </p:animEffect>
                                   </p:childTnLst>
                                 </p:cTn>
                               </p:par>
@@ -6294,7 +6311,7 @@
                             </p:stCondLst>
                             <p:childTnLst>
                               <p:par>
-                                <p:cTn id="21" presetID="1" presetClass="entr" presetSubtype="0" fill="hold" nodeType="clickEffect">
+                                <p:cTn id="21" presetID="10" presetClass="entr" presetSubtype="0" fill="hold" grpId="0" nodeType="clickEffect">
                                   <p:stCondLst>
                                     <p:cond delay="0"/>
                                   </p:stCondLst>
@@ -6307,7 +6324,7 @@
                                           </p:stCondLst>
                                         </p:cTn>
                                         <p:tgtEl>
-                                          <p:spTgt spid="22"/>
+                                          <p:spTgt spid="33"/>
                                         </p:tgtEl>
                                         <p:attrNameLst>
                                           <p:attrName>style.visibility</p:attrName>
@@ -6317,45 +6334,26 @@
                                         <p:strVal val="visible"/>
                                       </p:to>
                                     </p:set>
+                                    <p:animEffect transition="in" filter="fade">
+                                      <p:cBhvr>
+                                        <p:cTn id="23" dur="500"/>
+                                        <p:tgtEl>
+                                          <p:spTgt spid="33"/>
+                                        </p:tgtEl>
+                                      </p:cBhvr>
+                                    </p:animEffect>
                                   </p:childTnLst>
                                 </p:cTn>
                               </p:par>
                               <p:par>
-                                <p:cTn id="23" presetID="1" presetClass="entr" presetSubtype="0" fill="hold" nodeType="withEffect">
+                                <p:cTn id="24" presetID="10" presetClass="entr" presetSubtype="0" fill="hold" nodeType="withEffect">
                                   <p:stCondLst>
                                     <p:cond delay="0"/>
                                   </p:stCondLst>
                                   <p:childTnLst>
                                     <p:set>
                                       <p:cBhvr>
-                                        <p:cTn id="24" dur="1" fill="hold">
-                                          <p:stCondLst>
-                                            <p:cond delay="0"/>
-                                          </p:stCondLst>
-                                        </p:cTn>
-                                        <p:tgtEl>
-                                          <p:spTgt spid="28"/>
-                                        </p:tgtEl>
-                                        <p:attrNameLst>
-                                          <p:attrName>style.visibility</p:attrName>
-                                        </p:attrNameLst>
-                                      </p:cBhvr>
-                                      <p:to>
-                                        <p:strVal val="visible"/>
-                                      </p:to>
-                                    </p:set>
-                                  </p:childTnLst>
-                                </p:cTn>
-                              </p:par>
-                              <p:par>
-                                <p:cTn id="25" presetID="1" presetClass="entr" presetSubtype="0" fill="hold" nodeType="withEffect">
-                                  <p:stCondLst>
-                                    <p:cond delay="0"/>
-                                  </p:stCondLst>
-                                  <p:childTnLst>
-                                    <p:set>
-                                      <p:cBhvr>
-                                        <p:cTn id="26" dur="1" fill="hold">
+                                        <p:cTn id="25" dur="1" fill="hold">
                                           <p:stCondLst>
                                             <p:cond delay="0"/>
                                           </p:stCondLst>
@@ -6371,33 +6369,14 @@
                                         <p:strVal val="visible"/>
                                       </p:to>
                                     </p:set>
-                                  </p:childTnLst>
-                                </p:cTn>
-                              </p:par>
-                              <p:par>
-                                <p:cTn id="27" presetID="1" presetClass="entr" presetSubtype="0" fill="hold" nodeType="withEffect">
-                                  <p:stCondLst>
-                                    <p:cond delay="0"/>
-                                  </p:stCondLst>
-                                  <p:childTnLst>
-                                    <p:set>
+                                    <p:animEffect transition="in" filter="fade">
                                       <p:cBhvr>
-                                        <p:cTn id="28" dur="1" fill="hold">
-                                          <p:stCondLst>
-                                            <p:cond delay="0"/>
-                                          </p:stCondLst>
-                                        </p:cTn>
+                                        <p:cTn id="26" dur="500"/>
                                         <p:tgtEl>
-                                          <p:spTgt spid="30"/>
+                                          <p:spTgt spid="29"/>
                                         </p:tgtEl>
-                                        <p:attrNameLst>
-                                          <p:attrName>style.visibility</p:attrName>
-                                        </p:attrNameLst>
                                       </p:cBhvr>
-                                      <p:to>
-                                        <p:strVal val="visible"/>
-                                      </p:to>
-                                    </p:set>
+                                    </p:animEffect>
                                   </p:childTnLst>
                                 </p:cTn>
                               </p:par>
@@ -6408,32 +6387,32 @@
                     </p:cTn>
                   </p:par>
                   <p:par>
-                    <p:cTn id="29" fill="hold">
+                    <p:cTn id="27" fill="hold">
                       <p:stCondLst>
                         <p:cond delay="indefinite"/>
                       </p:stCondLst>
                       <p:childTnLst>
                         <p:par>
-                          <p:cTn id="30" fill="hold">
+                          <p:cTn id="28" fill="hold">
                             <p:stCondLst>
                               <p:cond delay="0"/>
                             </p:stCondLst>
                             <p:childTnLst>
                               <p:par>
-                                <p:cTn id="31" presetID="1" presetClass="entr" presetSubtype="0" fill="hold" grpId="0" nodeType="clickEffect">
+                                <p:cTn id="29" presetID="10" presetClass="entr" presetSubtype="0" fill="hold" nodeType="clickEffect">
                                   <p:stCondLst>
                                     <p:cond delay="0"/>
                                   </p:stCondLst>
                                   <p:childTnLst>
                                     <p:set>
                                       <p:cBhvr>
-                                        <p:cTn id="32" dur="1" fill="hold">
+                                        <p:cTn id="30" dur="1" fill="hold">
                                           <p:stCondLst>
                                             <p:cond delay="0"/>
                                           </p:stCondLst>
                                         </p:cTn>
                                         <p:tgtEl>
-                                          <p:spTgt spid="2"/>
+                                          <p:spTgt spid="55"/>
                                         </p:tgtEl>
                                         <p:attrNameLst>
                                           <p:attrName>style.visibility</p:attrName>
@@ -6443,24 +6422,32 @@
                                         <p:strVal val="visible"/>
                                       </p:to>
                                     </p:set>
+                                    <p:animEffect transition="in" filter="fade">
+                                      <p:cBhvr>
+                                        <p:cTn id="31" dur="500"/>
+                                        <p:tgtEl>
+                                          <p:spTgt spid="55"/>
+                                        </p:tgtEl>
+                                      </p:cBhvr>
+                                    </p:animEffect>
                                   </p:childTnLst>
                                 </p:cTn>
                               </p:par>
                               <p:par>
-                                <p:cTn id="33" presetID="1" presetClass="entr" presetSubtype="0" fill="hold" nodeType="withEffect">
+                                <p:cTn id="32" presetID="10" presetClass="entr" presetSubtype="0" fill="hold" grpId="0" nodeType="withEffect">
                                   <p:stCondLst>
                                     <p:cond delay="0"/>
                                   </p:stCondLst>
                                   <p:childTnLst>
                                     <p:set>
                                       <p:cBhvr>
-                                        <p:cTn id="34" dur="1" fill="hold">
+                                        <p:cTn id="33" dur="1" fill="hold">
                                           <p:stCondLst>
                                             <p:cond delay="0"/>
                                           </p:stCondLst>
                                         </p:cTn>
                                         <p:tgtEl>
-                                          <p:spTgt spid="4"/>
+                                          <p:spTgt spid="64"/>
                                         </p:tgtEl>
                                         <p:attrNameLst>
                                           <p:attrName>style.visibility</p:attrName>
@@ -6470,6 +6457,14 @@
                                         <p:strVal val="visible"/>
                                       </p:to>
                                     </p:set>
+                                    <p:animEffect transition="in" filter="fade">
+                                      <p:cBhvr>
+                                        <p:cTn id="34" dur="500"/>
+                                        <p:tgtEl>
+                                          <p:spTgt spid="64"/>
+                                        </p:tgtEl>
+                                      </p:cBhvr>
+                                    </p:animEffect>
                                   </p:childTnLst>
                                 </p:cTn>
                               </p:par>
@@ -6492,7 +6487,7 @@
                             </p:stCondLst>
                             <p:childTnLst>
                               <p:par>
-                                <p:cTn id="37" presetID="1" presetClass="entr" presetSubtype="0" fill="hold" grpId="0" nodeType="clickEffect">
+                                <p:cTn id="37" presetID="10" presetClass="entr" presetSubtype="0" fill="hold" grpId="0" nodeType="clickEffect">
                                   <p:stCondLst>
                                     <p:cond delay="0"/>
                                   </p:stCondLst>
@@ -6505,7 +6500,7 @@
                                           </p:stCondLst>
                                         </p:cTn>
                                         <p:tgtEl>
-                                          <p:spTgt spid="11"/>
+                                          <p:spTgt spid="100"/>
                                         </p:tgtEl>
                                         <p:attrNameLst>
                                           <p:attrName>style.visibility</p:attrName>
@@ -6515,24 +6510,32 @@
                                         <p:strVal val="visible"/>
                                       </p:to>
                                     </p:set>
+                                    <p:animEffect transition="in" filter="fade">
+                                      <p:cBhvr>
+                                        <p:cTn id="39" dur="500"/>
+                                        <p:tgtEl>
+                                          <p:spTgt spid="100"/>
+                                        </p:tgtEl>
+                                      </p:cBhvr>
+                                    </p:animEffect>
                                   </p:childTnLst>
                                 </p:cTn>
                               </p:par>
                               <p:par>
-                                <p:cTn id="39" presetID="1" presetClass="entr" presetSubtype="0" fill="hold" nodeType="withEffect">
+                                <p:cTn id="40" presetID="10" presetClass="entr" presetSubtype="0" fill="hold" nodeType="withEffect">
                                   <p:stCondLst>
                                     <p:cond delay="0"/>
                                   </p:stCondLst>
                                   <p:childTnLst>
                                     <p:set>
                                       <p:cBhvr>
-                                        <p:cTn id="40" dur="1" fill="hold">
+                                        <p:cTn id="41" dur="1" fill="hold">
                                           <p:stCondLst>
                                             <p:cond delay="0"/>
                                           </p:stCondLst>
                                         </p:cTn>
                                         <p:tgtEl>
-                                          <p:spTgt spid="23"/>
+                                          <p:spTgt spid="98"/>
                                         </p:tgtEl>
                                         <p:attrNameLst>
                                           <p:attrName>style.visibility</p:attrName>
@@ -6542,6 +6545,14 @@
                                         <p:strVal val="visible"/>
                                       </p:to>
                                     </p:set>
+                                    <p:animEffect transition="in" filter="fade">
+                                      <p:cBhvr>
+                                        <p:cTn id="42" dur="500"/>
+                                        <p:tgtEl>
+                                          <p:spTgt spid="98"/>
+                                        </p:tgtEl>
+                                      </p:cBhvr>
+                                    </p:animEffect>
                                   </p:childTnLst>
                                 </p:cTn>
                               </p:par>
@@ -6552,46 +6563,19 @@
                     </p:cTn>
                   </p:par>
                   <p:par>
-                    <p:cTn id="41" fill="hold">
+                    <p:cTn id="43" fill="hold">
                       <p:stCondLst>
                         <p:cond delay="indefinite"/>
                       </p:stCondLst>
                       <p:childTnLst>
                         <p:par>
-                          <p:cTn id="42" fill="hold">
+                          <p:cTn id="44" fill="hold">
                             <p:stCondLst>
                               <p:cond delay="0"/>
                             </p:stCondLst>
                             <p:childTnLst>
                               <p:par>
-                                <p:cTn id="43" presetID="1" presetClass="entr" presetSubtype="0" fill="hold" grpId="0" nodeType="clickEffect">
-                                  <p:stCondLst>
-                                    <p:cond delay="0"/>
-                                  </p:stCondLst>
-                                  <p:childTnLst>
-                                    <p:set>
-                                      <p:cBhvr>
-                                        <p:cTn id="44" dur="1" fill="hold">
-                                          <p:stCondLst>
-                                            <p:cond delay="0"/>
-                                          </p:stCondLst>
-                                        </p:cTn>
-                                        <p:tgtEl>
-                                          <p:spTgt spid="12"/>
-                                        </p:tgtEl>
-                                        <p:attrNameLst>
-                                          <p:attrName>style.visibility</p:attrName>
-                                        </p:attrNameLst>
-                                      </p:cBhvr>
-                                      <p:to>
-                                        <p:strVal val="visible"/>
-                                      </p:to>
-                                    </p:set>
-                                  </p:childTnLst>
-                                </p:cTn>
-                              </p:par>
-                              <p:par>
-                                <p:cTn id="45" presetID="1" presetClass="entr" presetSubtype="0" fill="hold" nodeType="withEffect">
+                                <p:cTn id="45" presetID="10" presetClass="entr" presetSubtype="0" fill="hold" nodeType="clickEffect">
                                   <p:stCondLst>
                                     <p:cond delay="0"/>
                                   </p:stCondLst>
@@ -6604,7 +6588,7 @@
                                           </p:stCondLst>
                                         </p:cTn>
                                         <p:tgtEl>
-                                          <p:spTgt spid="26"/>
+                                          <p:spTgt spid="103"/>
                                         </p:tgtEl>
                                         <p:attrNameLst>
                                           <p:attrName>style.visibility</p:attrName>
@@ -6614,42 +6598,32 @@
                                         <p:strVal val="visible"/>
                                       </p:to>
                                     </p:set>
+                                    <p:animEffect transition="in" filter="fade">
+                                      <p:cBhvr>
+                                        <p:cTn id="47" dur="500"/>
+                                        <p:tgtEl>
+                                          <p:spTgt spid="103"/>
+                                        </p:tgtEl>
+                                      </p:cBhvr>
+                                    </p:animEffect>
                                   </p:childTnLst>
                                 </p:cTn>
                               </p:par>
-                            </p:childTnLst>
-                          </p:cTn>
-                        </p:par>
-                      </p:childTnLst>
-                    </p:cTn>
-                  </p:par>
-                  <p:par>
-                    <p:cTn id="47" fill="hold">
-                      <p:stCondLst>
-                        <p:cond delay="indefinite"/>
-                      </p:stCondLst>
-                      <p:childTnLst>
-                        <p:par>
-                          <p:cTn id="48" fill="hold">
-                            <p:stCondLst>
-                              <p:cond delay="0"/>
-                            </p:stCondLst>
-                            <p:childTnLst>
                               <p:par>
-                                <p:cTn id="49" presetID="1" presetClass="entr" presetSubtype="0" fill="hold" nodeType="clickEffect">
+                                <p:cTn id="48" presetID="10" presetClass="entr" presetSubtype="0" fill="hold" grpId="0" nodeType="withEffect">
                                   <p:stCondLst>
                                     <p:cond delay="0"/>
                                   </p:stCondLst>
                                   <p:childTnLst>
                                     <p:set>
                                       <p:cBhvr>
-                                        <p:cTn id="50" dur="1" fill="hold">
+                                        <p:cTn id="49" dur="1" fill="hold">
                                           <p:stCondLst>
                                             <p:cond delay="0"/>
                                           </p:stCondLst>
                                         </p:cTn>
                                         <p:tgtEl>
-                                          <p:spTgt spid="63"/>
+                                          <p:spTgt spid="113"/>
                                         </p:tgtEl>
                                         <p:attrNameLst>
                                           <p:attrName>style.visibility</p:attrName>
@@ -6659,447 +6633,14 @@
                                         <p:strVal val="visible"/>
                                       </p:to>
                                     </p:set>
-                                  </p:childTnLst>
-                                </p:cTn>
-                              </p:par>
-                              <p:par>
-                                <p:cTn id="51" presetID="1" presetClass="entr" presetSubtype="0" fill="hold" grpId="0" nodeType="withEffect">
-                                  <p:stCondLst>
-                                    <p:cond delay="0"/>
-                                  </p:stCondLst>
-                                  <p:childTnLst>
-                                    <p:set>
+                                    <p:animEffect transition="in" filter="fade">
                                       <p:cBhvr>
-                                        <p:cTn id="52" dur="1" fill="hold">
-                                          <p:stCondLst>
-                                            <p:cond delay="0"/>
-                                          </p:stCondLst>
-                                        </p:cTn>
+                                        <p:cTn id="50" dur="500"/>
                                         <p:tgtEl>
-                                          <p:spTgt spid="13"/>
+                                          <p:spTgt spid="113"/>
                                         </p:tgtEl>
-                                        <p:attrNameLst>
-                                          <p:attrName>style.visibility</p:attrName>
-                                        </p:attrNameLst>
                                       </p:cBhvr>
-                                      <p:to>
-                                        <p:strVal val="visible"/>
-                                      </p:to>
-                                    </p:set>
-                                  </p:childTnLst>
-                                </p:cTn>
-                              </p:par>
-                              <p:par>
-                                <p:cTn id="53" presetID="1" presetClass="entr" presetSubtype="0" fill="hold" nodeType="withEffect">
-                                  <p:stCondLst>
-                                    <p:cond delay="0"/>
-                                  </p:stCondLst>
-                                  <p:childTnLst>
-                                    <p:set>
-                                      <p:cBhvr>
-                                        <p:cTn id="54" dur="1" fill="hold">
-                                          <p:stCondLst>
-                                            <p:cond delay="0"/>
-                                          </p:stCondLst>
-                                        </p:cTn>
-                                        <p:tgtEl>
-                                          <p:spTgt spid="66"/>
-                                        </p:tgtEl>
-                                        <p:attrNameLst>
-                                          <p:attrName>style.visibility</p:attrName>
-                                        </p:attrNameLst>
-                                      </p:cBhvr>
-                                      <p:to>
-                                        <p:strVal val="visible"/>
-                                      </p:to>
-                                    </p:set>
-                                  </p:childTnLst>
-                                </p:cTn>
-                              </p:par>
-                              <p:par>
-                                <p:cTn id="55" presetID="1" presetClass="entr" presetSubtype="0" fill="hold" nodeType="withEffect">
-                                  <p:stCondLst>
-                                    <p:cond delay="0"/>
-                                  </p:stCondLst>
-                                  <p:childTnLst>
-                                    <p:set>
-                                      <p:cBhvr>
-                                        <p:cTn id="56" dur="1" fill="hold">
-                                          <p:stCondLst>
-                                            <p:cond delay="0"/>
-                                          </p:stCondLst>
-                                        </p:cTn>
-                                        <p:tgtEl>
-                                          <p:spTgt spid="77"/>
-                                        </p:tgtEl>
-                                        <p:attrNameLst>
-                                          <p:attrName>style.visibility</p:attrName>
-                                        </p:attrNameLst>
-                                      </p:cBhvr>
-                                      <p:to>
-                                        <p:strVal val="visible"/>
-                                      </p:to>
-                                    </p:set>
-                                  </p:childTnLst>
-                                </p:cTn>
-                              </p:par>
-                            </p:childTnLst>
-                          </p:cTn>
-                        </p:par>
-                      </p:childTnLst>
-                    </p:cTn>
-                  </p:par>
-                  <p:par>
-                    <p:cTn id="57" fill="hold">
-                      <p:stCondLst>
-                        <p:cond delay="indefinite"/>
-                      </p:stCondLst>
-                      <p:childTnLst>
-                        <p:par>
-                          <p:cTn id="58" fill="hold">
-                            <p:stCondLst>
-                              <p:cond delay="0"/>
-                            </p:stCondLst>
-                            <p:childTnLst>
-                              <p:par>
-                                <p:cTn id="59" presetID="1" presetClass="entr" presetSubtype="0" fill="hold" grpId="0" nodeType="clickEffect">
-                                  <p:stCondLst>
-                                    <p:cond delay="0"/>
-                                  </p:stCondLst>
-                                  <p:childTnLst>
-                                    <p:set>
-                                      <p:cBhvr>
-                                        <p:cTn id="60" dur="1" fill="hold">
-                                          <p:stCondLst>
-                                            <p:cond delay="0"/>
-                                          </p:stCondLst>
-                                        </p:cTn>
-                                        <p:tgtEl>
-                                          <p:spTgt spid="14"/>
-                                        </p:tgtEl>
-                                        <p:attrNameLst>
-                                          <p:attrName>style.visibility</p:attrName>
-                                        </p:attrNameLst>
-                                      </p:cBhvr>
-                                      <p:to>
-                                        <p:strVal val="visible"/>
-                                      </p:to>
-                                    </p:set>
-                                  </p:childTnLst>
-                                </p:cTn>
-                              </p:par>
-                              <p:par>
-                                <p:cTn id="61" presetID="1" presetClass="entr" presetSubtype="0" fill="hold" nodeType="withEffect">
-                                  <p:stCondLst>
-                                    <p:cond delay="0"/>
-                                  </p:stCondLst>
-                                  <p:childTnLst>
-                                    <p:set>
-                                      <p:cBhvr>
-                                        <p:cTn id="62" dur="1" fill="hold">
-                                          <p:stCondLst>
-                                            <p:cond delay="0"/>
-                                          </p:stCondLst>
-                                        </p:cTn>
-                                        <p:tgtEl>
-                                          <p:spTgt spid="31"/>
-                                        </p:tgtEl>
-                                        <p:attrNameLst>
-                                          <p:attrName>style.visibility</p:attrName>
-                                        </p:attrNameLst>
-                                      </p:cBhvr>
-                                      <p:to>
-                                        <p:strVal val="visible"/>
-                                      </p:to>
-                                    </p:set>
-                                  </p:childTnLst>
-                                </p:cTn>
-                              </p:par>
-                            </p:childTnLst>
-                          </p:cTn>
-                        </p:par>
-                      </p:childTnLst>
-                    </p:cTn>
-                  </p:par>
-                  <p:par>
-                    <p:cTn id="63" fill="hold">
-                      <p:stCondLst>
-                        <p:cond delay="indefinite"/>
-                      </p:stCondLst>
-                      <p:childTnLst>
-                        <p:par>
-                          <p:cTn id="64" fill="hold">
-                            <p:stCondLst>
-                              <p:cond delay="0"/>
-                            </p:stCondLst>
-                            <p:childTnLst>
-                              <p:par>
-                                <p:cTn id="65" presetID="1" presetClass="entr" presetSubtype="0" fill="hold" nodeType="clickEffect">
-                                  <p:stCondLst>
-                                    <p:cond delay="0"/>
-                                  </p:stCondLst>
-                                  <p:childTnLst>
-                                    <p:set>
-                                      <p:cBhvr>
-                                        <p:cTn id="66" dur="1" fill="hold">
-                                          <p:stCondLst>
-                                            <p:cond delay="0"/>
-                                          </p:stCondLst>
-                                        </p:cTn>
-                                        <p:tgtEl>
-                                          <p:spTgt spid="74"/>
-                                        </p:tgtEl>
-                                        <p:attrNameLst>
-                                          <p:attrName>style.visibility</p:attrName>
-                                        </p:attrNameLst>
-                                      </p:cBhvr>
-                                      <p:to>
-                                        <p:strVal val="visible"/>
-                                      </p:to>
-                                    </p:set>
-                                  </p:childTnLst>
-                                </p:cTn>
-                              </p:par>
-                              <p:par>
-                                <p:cTn id="67" presetID="1" presetClass="entr" presetSubtype="0" fill="hold" grpId="0" nodeType="withEffect">
-                                  <p:stCondLst>
-                                    <p:cond delay="0"/>
-                                  </p:stCondLst>
-                                  <p:childTnLst>
-                                    <p:set>
-                                      <p:cBhvr>
-                                        <p:cTn id="68" dur="1" fill="hold">
-                                          <p:stCondLst>
-                                            <p:cond delay="0"/>
-                                          </p:stCondLst>
-                                        </p:cTn>
-                                        <p:tgtEl>
-                                          <p:spTgt spid="15"/>
-                                        </p:tgtEl>
-                                        <p:attrNameLst>
-                                          <p:attrName>style.visibility</p:attrName>
-                                        </p:attrNameLst>
-                                      </p:cBhvr>
-                                      <p:to>
-                                        <p:strVal val="visible"/>
-                                      </p:to>
-                                    </p:set>
-                                  </p:childTnLst>
-                                </p:cTn>
-                              </p:par>
-                            </p:childTnLst>
-                          </p:cTn>
-                        </p:par>
-                      </p:childTnLst>
-                    </p:cTn>
-                  </p:par>
-                  <p:par>
-                    <p:cTn id="69" fill="hold">
-                      <p:stCondLst>
-                        <p:cond delay="indefinite"/>
-                      </p:stCondLst>
-                      <p:childTnLst>
-                        <p:par>
-                          <p:cTn id="70" fill="hold">
-                            <p:stCondLst>
-                              <p:cond delay="0"/>
-                            </p:stCondLst>
-                            <p:childTnLst>
-                              <p:par>
-                                <p:cTn id="71" presetID="1" presetClass="entr" presetSubtype="0" fill="hold" grpId="0" nodeType="clickEffect">
-                                  <p:stCondLst>
-                                    <p:cond delay="0"/>
-                                  </p:stCondLst>
-                                  <p:childTnLst>
-                                    <p:set>
-                                      <p:cBhvr>
-                                        <p:cTn id="72" dur="1" fill="hold">
-                                          <p:stCondLst>
-                                            <p:cond delay="0"/>
-                                          </p:stCondLst>
-                                        </p:cTn>
-                                        <p:tgtEl>
-                                          <p:spTgt spid="36"/>
-                                        </p:tgtEl>
-                                        <p:attrNameLst>
-                                          <p:attrName>style.visibility</p:attrName>
-                                        </p:attrNameLst>
-                                      </p:cBhvr>
-                                      <p:to>
-                                        <p:strVal val="visible"/>
-                                      </p:to>
-                                    </p:set>
-                                  </p:childTnLst>
-                                </p:cTn>
-                              </p:par>
-                              <p:par>
-                                <p:cTn id="73" presetID="1" presetClass="entr" presetSubtype="0" fill="hold" nodeType="withEffect">
-                                  <p:stCondLst>
-                                    <p:cond delay="0"/>
-                                  </p:stCondLst>
-                                  <p:childTnLst>
-                                    <p:set>
-                                      <p:cBhvr>
-                                        <p:cTn id="74" dur="1" fill="hold">
-                                          <p:stCondLst>
-                                            <p:cond delay="0"/>
-                                          </p:stCondLst>
-                                        </p:cTn>
-                                        <p:tgtEl>
-                                          <p:spTgt spid="34"/>
-                                        </p:tgtEl>
-                                        <p:attrNameLst>
-                                          <p:attrName>style.visibility</p:attrName>
-                                        </p:attrNameLst>
-                                      </p:cBhvr>
-                                      <p:to>
-                                        <p:strVal val="visible"/>
-                                      </p:to>
-                                    </p:set>
-                                  </p:childTnLst>
-                                </p:cTn>
-                              </p:par>
-                            </p:childTnLst>
-                          </p:cTn>
-                        </p:par>
-                      </p:childTnLst>
-                    </p:cTn>
-                  </p:par>
-                  <p:par>
-                    <p:cTn id="75" fill="hold">
-                      <p:stCondLst>
-                        <p:cond delay="indefinite"/>
-                      </p:stCondLst>
-                      <p:childTnLst>
-                        <p:par>
-                          <p:cTn id="76" fill="hold">
-                            <p:stCondLst>
-                              <p:cond delay="0"/>
-                            </p:stCondLst>
-                            <p:childTnLst>
-                              <p:par>
-                                <p:cTn id="77" presetID="1" presetClass="entr" presetSubtype="0" fill="hold" grpId="0" nodeType="clickEffect">
-                                  <p:stCondLst>
-                                    <p:cond delay="0"/>
-                                  </p:stCondLst>
-                                  <p:childTnLst>
-                                    <p:set>
-                                      <p:cBhvr>
-                                        <p:cTn id="78" dur="1" fill="hold">
-                                          <p:stCondLst>
-                                            <p:cond delay="0"/>
-                                          </p:stCondLst>
-                                        </p:cTn>
-                                        <p:tgtEl>
-                                          <p:spTgt spid="16"/>
-                                        </p:tgtEl>
-                                        <p:attrNameLst>
-                                          <p:attrName>style.visibility</p:attrName>
-                                        </p:attrNameLst>
-                                      </p:cBhvr>
-                                      <p:to>
-                                        <p:strVal val="visible"/>
-                                      </p:to>
-                                    </p:set>
-                                  </p:childTnLst>
-                                </p:cTn>
-                              </p:par>
-                              <p:par>
-                                <p:cTn id="79" presetID="1" presetClass="entr" presetSubtype="0" fill="hold" nodeType="withEffect">
-                                  <p:stCondLst>
-                                    <p:cond delay="0"/>
-                                  </p:stCondLst>
-                                  <p:childTnLst>
-                                    <p:set>
-                                      <p:cBhvr>
-                                        <p:cTn id="80" dur="1" fill="hold">
-                                          <p:stCondLst>
-                                            <p:cond delay="0"/>
-                                          </p:stCondLst>
-                                        </p:cTn>
-                                        <p:tgtEl>
-                                          <p:spTgt spid="37"/>
-                                        </p:tgtEl>
-                                        <p:attrNameLst>
-                                          <p:attrName>style.visibility</p:attrName>
-                                        </p:attrNameLst>
-                                      </p:cBhvr>
-                                      <p:to>
-                                        <p:strVal val="visible"/>
-                                      </p:to>
-                                    </p:set>
-                                  </p:childTnLst>
-                                </p:cTn>
-                              </p:par>
-                            </p:childTnLst>
-                          </p:cTn>
-                        </p:par>
-                      </p:childTnLst>
-                    </p:cTn>
-                  </p:par>
-                  <p:par>
-                    <p:cTn id="81" fill="hold">
-                      <p:stCondLst>
-                        <p:cond delay="indefinite"/>
-                      </p:stCondLst>
-                      <p:childTnLst>
-                        <p:par>
-                          <p:cTn id="82" fill="hold">
-                            <p:stCondLst>
-                              <p:cond delay="0"/>
-                            </p:stCondLst>
-                            <p:childTnLst>
-                              <p:par>
-                                <p:cTn id="83" presetID="1" presetClass="entr" presetSubtype="0" fill="hold" grpId="0" nodeType="clickEffect">
-                                  <p:stCondLst>
-                                    <p:cond delay="0"/>
-                                  </p:stCondLst>
-                                  <p:childTnLst>
-                                    <p:set>
-                                      <p:cBhvr>
-                                        <p:cTn id="84" dur="1" fill="hold">
-                                          <p:stCondLst>
-                                            <p:cond delay="0"/>
-                                          </p:stCondLst>
-                                        </p:cTn>
-                                        <p:tgtEl>
-                                          <p:spTgt spid="21"/>
-                                        </p:tgtEl>
-                                        <p:attrNameLst>
-                                          <p:attrName>style.visibility</p:attrName>
-                                        </p:attrNameLst>
-                                      </p:cBhvr>
-                                      <p:to>
-                                        <p:strVal val="visible"/>
-                                      </p:to>
-                                    </p:set>
-                                  </p:childTnLst>
-                                </p:cTn>
-                              </p:par>
-                              <p:par>
-                                <p:cTn id="85" presetID="1" presetClass="entr" presetSubtype="0" fill="hold" nodeType="withEffect">
-                                  <p:stCondLst>
-                                    <p:cond delay="0"/>
-                                  </p:stCondLst>
-                                  <p:childTnLst>
-                                    <p:set>
-                                      <p:cBhvr>
-                                        <p:cTn id="86" dur="1" fill="hold">
-                                          <p:stCondLst>
-                                            <p:cond delay="0"/>
-                                          </p:stCondLst>
-                                        </p:cTn>
-                                        <p:tgtEl>
-                                          <p:spTgt spid="39"/>
-                                        </p:tgtEl>
-                                        <p:attrNameLst>
-                                          <p:attrName>style.visibility</p:attrName>
-                                        </p:attrNameLst>
-                                      </p:cBhvr>
-                                      <p:to>
-                                        <p:strVal val="visible"/>
-                                      </p:to>
-                                    </p:set>
+                                    </p:animEffect>
                                   </p:childTnLst>
                                 </p:cTn>
                               </p:par>
@@ -7131,19 +6672,12 @@
       </p:par>
     </p:tnLst>
     <p:bldLst>
-      <p:bldP spid="17" grpId="0" animBg="1"/>
-      <p:bldP spid="18" grpId="0" animBg="1"/>
-      <p:bldP spid="19" grpId="0" animBg="1"/>
-      <p:bldP spid="20" grpId="0" animBg="1"/>
-      <p:bldP spid="2" grpId="0"/>
-      <p:bldP spid="11" grpId="0"/>
-      <p:bldP spid="12" grpId="0"/>
-      <p:bldP spid="13" grpId="0"/>
-      <p:bldP spid="14" grpId="0"/>
-      <p:bldP spid="15" grpId="0"/>
-      <p:bldP spid="16" grpId="0"/>
-      <p:bldP spid="21" grpId="0"/>
-      <p:bldP spid="36" grpId="0"/>
+      <p:bldP spid="33" grpId="0"/>
+      <p:bldP spid="37" grpId="0"/>
+      <p:bldP spid="41" grpId="0"/>
+      <p:bldP spid="64" grpId="0"/>
+      <p:bldP spid="100" grpId="0"/>
+      <p:bldP spid="113" grpId="0"/>
     </p:bldLst>
   </p:timing>
 </p:sld>

</xml_diff>